<commit_message>
完成控制器结构修改，cascade ADRC position Z control
</commit_message>
<xml_diff>
--- a/控制框图说明.pptx
+++ b/控制框图说明.pptx
@@ -5,11 +5,13 @@
     <p:sldMasterId id="2147483648" r:id="rId1"/>
   </p:sldMasterIdLst>
   <p:notesMasterIdLst>
-    <p:notesMasterId r:id="rId4"/>
+    <p:notesMasterId r:id="rId6"/>
   </p:notesMasterIdLst>
   <p:sldIdLst>
     <p:sldId id="258" r:id="rId2"/>
     <p:sldId id="256" r:id="rId3"/>
+    <p:sldId id="259" r:id="rId4"/>
+    <p:sldId id="260" r:id="rId5"/>
   </p:sldIdLst>
   <p:sldSz cx="12192000" cy="6858000"/>
   <p:notesSz cx="6858000" cy="9144000"/>
@@ -198,7 +200,7 @@
           <a:p>
             <a:fld id="{B180E7EF-D37D-4E22-8DE8-23437848A5B5}" type="datetimeFigureOut">
               <a:rPr lang="zh-CN" altLang="en-US" smtClean="0"/>
-              <a:t>2021/11/27</a:t>
+              <a:t>2021/11/28</a:t>
             </a:fld>
             <a:endParaRPr lang="zh-CN" altLang="en-US"/>
           </a:p>
@@ -550,6 +552,174 @@
 </p:notes>
 </file>
 
+<file path=ppt/notesSlides/notesSlide2.xml><?xml version="1.0" encoding="utf-8"?>
+<p:notes xmlns:a="http://schemas.openxmlformats.org/drawingml/2006/main" xmlns:r="http://schemas.openxmlformats.org/officeDocument/2006/relationships" xmlns:p="http://schemas.openxmlformats.org/presentationml/2006/main">
+  <p:cSld>
+    <p:spTree>
+      <p:nvGrpSpPr>
+        <p:cNvPr id="1" name=""/>
+        <p:cNvGrpSpPr/>
+        <p:nvPr/>
+      </p:nvGrpSpPr>
+      <p:grpSpPr>
+        <a:xfrm>
+          <a:off x="0" y="0"/>
+          <a:ext cx="0" cy="0"/>
+          <a:chOff x="0" y="0"/>
+          <a:chExt cx="0" cy="0"/>
+        </a:xfrm>
+      </p:grpSpPr>
+      <p:sp>
+        <p:nvSpPr>
+          <p:cNvPr id="2" name="幻灯片图像占位符 1"/>
+          <p:cNvSpPr>
+            <a:spLocks noGrp="1" noRot="1" noChangeAspect="1"/>
+          </p:cNvSpPr>
+          <p:nvPr>
+            <p:ph type="sldImg"/>
+          </p:nvPr>
+        </p:nvSpPr>
+        <p:spPr/>
+      </p:sp>
+      <p:sp>
+        <p:nvSpPr>
+          <p:cNvPr id="3" name="备注占位符 2"/>
+          <p:cNvSpPr>
+            <a:spLocks noGrp="1"/>
+          </p:cNvSpPr>
+          <p:nvPr>
+            <p:ph type="body" idx="1"/>
+          </p:nvPr>
+        </p:nvSpPr>
+        <p:spPr/>
+        <p:txBody>
+          <a:bodyPr/>
+          <a:lstStyle/>
+          <a:p>
+            <a:endParaRPr lang="zh-CN" altLang="en-US" dirty="0"/>
+          </a:p>
+        </p:txBody>
+      </p:sp>
+      <p:sp>
+        <p:nvSpPr>
+          <p:cNvPr id="4" name="灯片编号占位符 3"/>
+          <p:cNvSpPr>
+            <a:spLocks noGrp="1"/>
+          </p:cNvSpPr>
+          <p:nvPr>
+            <p:ph type="sldNum" sz="quarter" idx="10"/>
+          </p:nvPr>
+        </p:nvSpPr>
+        <p:spPr/>
+        <p:txBody>
+          <a:bodyPr/>
+          <a:lstStyle/>
+          <a:p>
+            <a:fld id="{DAA7DBD3-B20D-4065-838F-388A676883AF}" type="slidenum">
+              <a:rPr lang="zh-CN" altLang="en-US" smtClean="0"/>
+              <a:t>3</a:t>
+            </a:fld>
+            <a:endParaRPr lang="zh-CN" altLang="en-US"/>
+          </a:p>
+        </p:txBody>
+      </p:sp>
+    </p:spTree>
+    <p:extLst>
+      <p:ext uri="{BB962C8B-B14F-4D97-AF65-F5344CB8AC3E}">
+        <p14:creationId xmlns:p14="http://schemas.microsoft.com/office/powerpoint/2010/main" val="2592752660"/>
+      </p:ext>
+    </p:extLst>
+  </p:cSld>
+  <p:clrMapOvr>
+    <a:masterClrMapping/>
+  </p:clrMapOvr>
+</p:notes>
+</file>
+
+<file path=ppt/notesSlides/notesSlide3.xml><?xml version="1.0" encoding="utf-8"?>
+<p:notes xmlns:a="http://schemas.openxmlformats.org/drawingml/2006/main" xmlns:r="http://schemas.openxmlformats.org/officeDocument/2006/relationships" xmlns:p="http://schemas.openxmlformats.org/presentationml/2006/main">
+  <p:cSld>
+    <p:spTree>
+      <p:nvGrpSpPr>
+        <p:cNvPr id="1" name=""/>
+        <p:cNvGrpSpPr/>
+        <p:nvPr/>
+      </p:nvGrpSpPr>
+      <p:grpSpPr>
+        <a:xfrm>
+          <a:off x="0" y="0"/>
+          <a:ext cx="0" cy="0"/>
+          <a:chOff x="0" y="0"/>
+          <a:chExt cx="0" cy="0"/>
+        </a:xfrm>
+      </p:grpSpPr>
+      <p:sp>
+        <p:nvSpPr>
+          <p:cNvPr id="2" name="幻灯片图像占位符 1"/>
+          <p:cNvSpPr>
+            <a:spLocks noGrp="1" noRot="1" noChangeAspect="1"/>
+          </p:cNvSpPr>
+          <p:nvPr>
+            <p:ph type="sldImg"/>
+          </p:nvPr>
+        </p:nvSpPr>
+        <p:spPr/>
+      </p:sp>
+      <p:sp>
+        <p:nvSpPr>
+          <p:cNvPr id="3" name="备注占位符 2"/>
+          <p:cNvSpPr>
+            <a:spLocks noGrp="1"/>
+          </p:cNvSpPr>
+          <p:nvPr>
+            <p:ph type="body" idx="1"/>
+          </p:nvPr>
+        </p:nvSpPr>
+        <p:spPr/>
+        <p:txBody>
+          <a:bodyPr/>
+          <a:lstStyle/>
+          <a:p>
+            <a:endParaRPr lang="zh-CN" altLang="en-US" dirty="0"/>
+          </a:p>
+        </p:txBody>
+      </p:sp>
+      <p:sp>
+        <p:nvSpPr>
+          <p:cNvPr id="4" name="灯片编号占位符 3"/>
+          <p:cNvSpPr>
+            <a:spLocks noGrp="1"/>
+          </p:cNvSpPr>
+          <p:nvPr>
+            <p:ph type="sldNum" sz="quarter" idx="10"/>
+          </p:nvPr>
+        </p:nvSpPr>
+        <p:spPr/>
+        <p:txBody>
+          <a:bodyPr/>
+          <a:lstStyle/>
+          <a:p>
+            <a:fld id="{DAA7DBD3-B20D-4065-838F-388A676883AF}" type="slidenum">
+              <a:rPr lang="zh-CN" altLang="en-US" smtClean="0"/>
+              <a:t>4</a:t>
+            </a:fld>
+            <a:endParaRPr lang="zh-CN" altLang="en-US"/>
+          </a:p>
+        </p:txBody>
+      </p:sp>
+    </p:spTree>
+    <p:extLst>
+      <p:ext uri="{BB962C8B-B14F-4D97-AF65-F5344CB8AC3E}">
+        <p14:creationId xmlns:p14="http://schemas.microsoft.com/office/powerpoint/2010/main" val="1640497360"/>
+      </p:ext>
+    </p:extLst>
+  </p:cSld>
+  <p:clrMapOvr>
+    <a:masterClrMapping/>
+  </p:clrMapOvr>
+</p:notes>
+</file>
+
 <file path=ppt/slideLayouts/slideLayout1.xml><?xml version="1.0" encoding="utf-8"?>
 <p:sldLayout xmlns:a="http://schemas.openxmlformats.org/drawingml/2006/main" xmlns:r="http://schemas.openxmlformats.org/officeDocument/2006/relationships" xmlns:p="http://schemas.openxmlformats.org/presentationml/2006/main" type="title" preserve="1">
   <p:cSld name="标题幻灯片">
@@ -681,7 +851,7 @@
           <a:p>
             <a:fld id="{D5D86183-1A27-425D-9692-264495573DC9}" type="datetimeFigureOut">
               <a:rPr lang="zh-CN" altLang="en-US" smtClean="0"/>
-              <a:t>2021/11/27</a:t>
+              <a:t>2021/11/28</a:t>
             </a:fld>
             <a:endParaRPr lang="zh-CN" altLang="en-US"/>
           </a:p>
@@ -851,7 +1021,7 @@
           <a:p>
             <a:fld id="{D5D86183-1A27-425D-9692-264495573DC9}" type="datetimeFigureOut">
               <a:rPr lang="zh-CN" altLang="en-US" smtClean="0"/>
-              <a:t>2021/11/27</a:t>
+              <a:t>2021/11/28</a:t>
             </a:fld>
             <a:endParaRPr lang="zh-CN" altLang="en-US"/>
           </a:p>
@@ -1031,7 +1201,7 @@
           <a:p>
             <a:fld id="{D5D86183-1A27-425D-9692-264495573DC9}" type="datetimeFigureOut">
               <a:rPr lang="zh-CN" altLang="en-US" smtClean="0"/>
-              <a:t>2021/11/27</a:t>
+              <a:t>2021/11/28</a:t>
             </a:fld>
             <a:endParaRPr lang="zh-CN" altLang="en-US"/>
           </a:p>
@@ -1201,7 +1371,7 @@
           <a:p>
             <a:fld id="{D5D86183-1A27-425D-9692-264495573DC9}" type="datetimeFigureOut">
               <a:rPr lang="zh-CN" altLang="en-US" smtClean="0"/>
-              <a:t>2021/11/27</a:t>
+              <a:t>2021/11/28</a:t>
             </a:fld>
             <a:endParaRPr lang="zh-CN" altLang="en-US"/>
           </a:p>
@@ -1447,7 +1617,7 @@
           <a:p>
             <a:fld id="{D5D86183-1A27-425D-9692-264495573DC9}" type="datetimeFigureOut">
               <a:rPr lang="zh-CN" altLang="en-US" smtClean="0"/>
-              <a:t>2021/11/27</a:t>
+              <a:t>2021/11/28</a:t>
             </a:fld>
             <a:endParaRPr lang="zh-CN" altLang="en-US"/>
           </a:p>
@@ -1679,7 +1849,7 @@
           <a:p>
             <a:fld id="{D5D86183-1A27-425D-9692-264495573DC9}" type="datetimeFigureOut">
               <a:rPr lang="zh-CN" altLang="en-US" smtClean="0"/>
-              <a:t>2021/11/27</a:t>
+              <a:t>2021/11/28</a:t>
             </a:fld>
             <a:endParaRPr lang="zh-CN" altLang="en-US"/>
           </a:p>
@@ -2046,7 +2216,7 @@
           <a:p>
             <a:fld id="{D5D86183-1A27-425D-9692-264495573DC9}" type="datetimeFigureOut">
               <a:rPr lang="zh-CN" altLang="en-US" smtClean="0"/>
-              <a:t>2021/11/27</a:t>
+              <a:t>2021/11/28</a:t>
             </a:fld>
             <a:endParaRPr lang="zh-CN" altLang="en-US"/>
           </a:p>
@@ -2164,7 +2334,7 @@
           <a:p>
             <a:fld id="{D5D86183-1A27-425D-9692-264495573DC9}" type="datetimeFigureOut">
               <a:rPr lang="zh-CN" altLang="en-US" smtClean="0"/>
-              <a:t>2021/11/27</a:t>
+              <a:t>2021/11/28</a:t>
             </a:fld>
             <a:endParaRPr lang="zh-CN" altLang="en-US"/>
           </a:p>
@@ -2259,7 +2429,7 @@
           <a:p>
             <a:fld id="{D5D86183-1A27-425D-9692-264495573DC9}" type="datetimeFigureOut">
               <a:rPr lang="zh-CN" altLang="en-US" smtClean="0"/>
-              <a:t>2021/11/27</a:t>
+              <a:t>2021/11/28</a:t>
             </a:fld>
             <a:endParaRPr lang="zh-CN" altLang="en-US"/>
           </a:p>
@@ -2536,7 +2706,7 @@
           <a:p>
             <a:fld id="{D5D86183-1A27-425D-9692-264495573DC9}" type="datetimeFigureOut">
               <a:rPr lang="zh-CN" altLang="en-US" smtClean="0"/>
-              <a:t>2021/11/27</a:t>
+              <a:t>2021/11/28</a:t>
             </a:fld>
             <a:endParaRPr lang="zh-CN" altLang="en-US"/>
           </a:p>
@@ -2789,7 +2959,7 @@
           <a:p>
             <a:fld id="{D5D86183-1A27-425D-9692-264495573DC9}" type="datetimeFigureOut">
               <a:rPr lang="zh-CN" altLang="en-US" smtClean="0"/>
-              <a:t>2021/11/27</a:t>
+              <a:t>2021/11/28</a:t>
             </a:fld>
             <a:endParaRPr lang="zh-CN" altLang="en-US"/>
           </a:p>
@@ -3002,7 +3172,7 @@
           <a:p>
             <a:fld id="{D5D86183-1A27-425D-9692-264495573DC9}" type="datetimeFigureOut">
               <a:rPr lang="zh-CN" altLang="en-US" smtClean="0"/>
-              <a:t>2021/11/27</a:t>
+              <a:t>2021/11/28</a:t>
             </a:fld>
             <a:endParaRPr lang="zh-CN" altLang="en-US"/>
           </a:p>
@@ -5144,7 +5314,6 @@
               <a:rPr lang="en-US" altLang="zh-CN" sz="1200" dirty="0" smtClean="0"/>
               <a:t>TD</a:t>
             </a:r>
-            <a:endParaRPr lang="en-US" altLang="zh-CN" sz="1200" dirty="0" smtClean="0"/>
           </a:p>
         </p:txBody>
       </p:sp>
@@ -5188,7 +5357,6 @@
               <a:rPr lang="en-US" altLang="zh-CN" sz="1200" dirty="0" smtClean="0"/>
               <a:t>PID_Z</a:t>
             </a:r>
-            <a:endParaRPr lang="en-US" altLang="zh-CN" sz="1200" dirty="0" smtClean="0"/>
           </a:p>
         </p:txBody>
       </p:sp>
@@ -5232,7 +5400,6 @@
               <a:rPr lang="en-US" altLang="zh-CN" sz="1000" dirty="0" smtClean="0"/>
               <a:t>NLSEF_VZ</a:t>
             </a:r>
-            <a:endParaRPr lang="en-US" altLang="zh-CN" sz="1000" dirty="0" smtClean="0"/>
           </a:p>
         </p:txBody>
       </p:sp>
@@ -5276,7 +5443,6 @@
               <a:rPr lang="en-US" altLang="zh-CN" sz="1200" dirty="0" smtClean="0"/>
               <a:t>MBD</a:t>
             </a:r>
-            <a:endParaRPr lang="en-US" altLang="zh-CN" sz="1200" dirty="0" smtClean="0"/>
           </a:p>
         </p:txBody>
       </p:sp>
@@ -6812,80 +6978,12 @@
                 <a:latin typeface="Calibri" panose="020F0502020204030204" pitchFamily="34" charset="0"/>
                 <a:cs typeface="Calibri" panose="020F0502020204030204" pitchFamily="34" charset="0"/>
               </a:rPr>
-              <a:t>aZ_d(TD</a:t>
-            </a:r>
-            <a:r>
-              <a:rPr lang="en-US" altLang="zh-CN" sz="1200" dirty="0" smtClean="0">
-                <a:latin typeface="Calibri" panose="020F0502020204030204" pitchFamily="34" charset="0"/>
-                <a:cs typeface="Calibri" panose="020F0502020204030204" pitchFamily="34" charset="0"/>
-              </a:rPr>
-              <a:t>.fh</a:t>
-            </a:r>
-            <a:r>
-              <a:rPr lang="en-US" altLang="zh-CN" sz="1200" dirty="0" smtClean="0">
-                <a:latin typeface="Calibri" panose="020F0502020204030204" pitchFamily="34" charset="0"/>
-                <a:cs typeface="Calibri" panose="020F0502020204030204" pitchFamily="34" charset="0"/>
-              </a:rPr>
-              <a:t>)</a:t>
+              <a:t>aZ_d(TD.fh)</a:t>
             </a:r>
             <a:endParaRPr lang="zh-CN" altLang="en-US" sz="1200" dirty="0">
               <a:latin typeface="Calibri" panose="020F0502020204030204" pitchFamily="34" charset="0"/>
               <a:cs typeface="Calibri" panose="020F0502020204030204" pitchFamily="34" charset="0"/>
             </a:endParaRPr>
-          </a:p>
-        </p:txBody>
-      </p:sp>
-      <p:sp>
-        <p:nvSpPr>
-          <p:cNvPr id="228" name="圆角矩形 227"/>
-          <p:cNvSpPr/>
-          <p:nvPr/>
-        </p:nvSpPr>
-        <p:spPr>
-          <a:xfrm>
-            <a:off x="360218" y="304800"/>
-            <a:ext cx="3210016" cy="905163"/>
-          </a:xfrm>
-          <a:prstGeom prst="roundRect">
-            <a:avLst/>
-          </a:prstGeom>
-          <a:solidFill>
-            <a:srgbClr val="FF0000"/>
-          </a:solidFill>
-        </p:spPr>
-        <p:style>
-          <a:lnRef idx="2">
-            <a:schemeClr val="accent1">
-              <a:shade val="50000"/>
-            </a:schemeClr>
-          </a:lnRef>
-          <a:fillRef idx="1">
-            <a:schemeClr val="accent1"/>
-          </a:fillRef>
-          <a:effectRef idx="0">
-            <a:schemeClr val="accent1"/>
-          </a:effectRef>
-          <a:fontRef idx="minor">
-            <a:schemeClr val="lt1"/>
-          </a:fontRef>
-        </p:style>
-        <p:txBody>
-          <a:bodyPr rtlCol="0" anchor="ctr"/>
-          <a:lstStyle/>
-          <a:p>
-            <a:pPr algn="ctr"/>
-            <a:r>
-              <a:rPr lang="en-US" altLang="zh-CN" dirty="0" smtClean="0"/>
-              <a:t>The control block diagram</a:t>
-            </a:r>
-          </a:p>
-          <a:p>
-            <a:pPr algn="ctr"/>
-            <a:r>
-              <a:rPr lang="en-US" altLang="zh-CN" dirty="0" smtClean="0"/>
-              <a:t> in this program</a:t>
-            </a:r>
-            <a:endParaRPr lang="zh-CN" altLang="en-US" dirty="0"/>
           </a:p>
         </p:txBody>
       </p:sp>
@@ -7059,6 +7157,2663 @@
     <p:extLst>
       <p:ext uri="{BB962C8B-B14F-4D97-AF65-F5344CB8AC3E}">
         <p14:creationId xmlns:p14="http://schemas.microsoft.com/office/powerpoint/2010/main" val="892154676"/>
+      </p:ext>
+    </p:extLst>
+  </p:cSld>
+  <p:clrMapOvr>
+    <a:masterClrMapping/>
+  </p:clrMapOvr>
+</p:sld>
+</file>
+
+<file path=ppt/slides/slide3.xml><?xml version="1.0" encoding="utf-8"?>
+<p:sld xmlns:a="http://schemas.openxmlformats.org/drawingml/2006/main" xmlns:r="http://schemas.openxmlformats.org/officeDocument/2006/relationships" xmlns:p="http://schemas.openxmlformats.org/presentationml/2006/main">
+  <p:cSld>
+    <p:spTree>
+      <p:nvGrpSpPr>
+        <p:cNvPr id="1" name=""/>
+        <p:cNvGrpSpPr/>
+        <p:nvPr/>
+      </p:nvGrpSpPr>
+      <p:grpSpPr>
+        <a:xfrm>
+          <a:off x="0" y="0"/>
+          <a:ext cx="0" cy="0"/>
+          <a:chOff x="0" y="0"/>
+          <a:chExt cx="0" cy="0"/>
+        </a:xfrm>
+      </p:grpSpPr>
+      <p:sp>
+        <p:nvSpPr>
+          <p:cNvPr id="73" name="圆角矩形 72"/>
+          <p:cNvSpPr/>
+          <p:nvPr/>
+        </p:nvSpPr>
+        <p:spPr>
+          <a:xfrm>
+            <a:off x="4641110" y="1438183"/>
+            <a:ext cx="4440746" cy="3266981"/>
+          </a:xfrm>
+          <a:prstGeom prst="roundRect">
+            <a:avLst/>
+          </a:prstGeom>
+          <a:solidFill>
+            <a:schemeClr val="accent1">
+              <a:lumMod val="20000"/>
+              <a:lumOff val="80000"/>
+            </a:schemeClr>
+          </a:solidFill>
+          <a:ln>
+            <a:solidFill>
+              <a:schemeClr val="bg1"/>
+            </a:solidFill>
+          </a:ln>
+        </p:spPr>
+        <p:style>
+          <a:lnRef idx="2">
+            <a:schemeClr val="accent1">
+              <a:shade val="50000"/>
+            </a:schemeClr>
+          </a:lnRef>
+          <a:fillRef idx="1">
+            <a:schemeClr val="accent1"/>
+          </a:fillRef>
+          <a:effectRef idx="0">
+            <a:schemeClr val="accent1"/>
+          </a:effectRef>
+          <a:fontRef idx="minor">
+            <a:schemeClr val="lt1"/>
+          </a:fontRef>
+        </p:style>
+        <p:txBody>
+          <a:bodyPr rtlCol="0" anchor="ctr"/>
+          <a:lstStyle/>
+          <a:p>
+            <a:pPr algn="ctr"/>
+            <a:endParaRPr lang="zh-CN" altLang="en-US" dirty="0"/>
+          </a:p>
+        </p:txBody>
+      </p:sp>
+      <p:sp>
+        <p:nvSpPr>
+          <p:cNvPr id="72" name="圆角矩形 71"/>
+          <p:cNvSpPr/>
+          <p:nvPr/>
+        </p:nvSpPr>
+        <p:spPr>
+          <a:xfrm>
+            <a:off x="1682170" y="1438184"/>
+            <a:ext cx="2761562" cy="3266980"/>
+          </a:xfrm>
+          <a:prstGeom prst="roundRect">
+            <a:avLst/>
+          </a:prstGeom>
+          <a:solidFill>
+            <a:schemeClr val="accent1">
+              <a:lumMod val="20000"/>
+              <a:lumOff val="80000"/>
+            </a:schemeClr>
+          </a:solidFill>
+          <a:ln>
+            <a:solidFill>
+              <a:schemeClr val="bg1"/>
+            </a:solidFill>
+          </a:ln>
+        </p:spPr>
+        <p:style>
+          <a:lnRef idx="2">
+            <a:schemeClr val="accent1">
+              <a:shade val="50000"/>
+            </a:schemeClr>
+          </a:lnRef>
+          <a:fillRef idx="1">
+            <a:schemeClr val="accent1"/>
+          </a:fillRef>
+          <a:effectRef idx="0">
+            <a:schemeClr val="accent1"/>
+          </a:effectRef>
+          <a:fontRef idx="minor">
+            <a:schemeClr val="lt1"/>
+          </a:fontRef>
+        </p:style>
+        <p:txBody>
+          <a:bodyPr rtlCol="0" anchor="ctr"/>
+          <a:lstStyle/>
+          <a:p>
+            <a:pPr algn="ctr"/>
+            <a:endParaRPr lang="zh-CN" altLang="en-US" dirty="0"/>
+          </a:p>
+        </p:txBody>
+      </p:sp>
+      <p:cxnSp>
+        <p:nvCxnSpPr>
+          <p:cNvPr id="111" name="直接箭头连接符 110"/>
+          <p:cNvCxnSpPr>
+            <a:endCxn id="39" idx="1"/>
+          </p:cNvCxnSpPr>
+          <p:nvPr/>
+        </p:nvCxnSpPr>
+        <p:spPr>
+          <a:xfrm>
+            <a:off x="1271975" y="2637723"/>
+            <a:ext cx="642370" cy="5865"/>
+          </a:xfrm>
+          <a:prstGeom prst="straightConnector1">
+            <a:avLst/>
+          </a:prstGeom>
+          <a:ln>
+            <a:tailEnd type="triangle"/>
+          </a:ln>
+        </p:spPr>
+        <p:style>
+          <a:lnRef idx="1">
+            <a:schemeClr val="accent1"/>
+          </a:lnRef>
+          <a:fillRef idx="0">
+            <a:schemeClr val="accent1"/>
+          </a:fillRef>
+          <a:effectRef idx="0">
+            <a:schemeClr val="accent1"/>
+          </a:effectRef>
+          <a:fontRef idx="minor">
+            <a:schemeClr val="tx1"/>
+          </a:fontRef>
+        </p:style>
+      </p:cxnSp>
+      <p:sp>
+        <p:nvSpPr>
+          <p:cNvPr id="130" name="文本框 129"/>
+          <p:cNvSpPr txBox="1"/>
+          <p:nvPr/>
+        </p:nvSpPr>
+        <p:spPr>
+          <a:xfrm>
+            <a:off x="1117108" y="2387284"/>
+            <a:ext cx="842361" cy="276999"/>
+          </a:xfrm>
+          <a:prstGeom prst="rect">
+            <a:avLst/>
+          </a:prstGeom>
+          <a:noFill/>
+        </p:spPr>
+        <p:txBody>
+          <a:bodyPr wrap="square" rtlCol="0">
+            <a:spAutoFit/>
+          </a:bodyPr>
+          <a:lstStyle/>
+          <a:p>
+            <a:r>
+              <a:rPr lang="en-US" altLang="zh-CN" sz="1200" dirty="0" smtClean="0">
+                <a:latin typeface="Calibri" panose="020F0502020204030204" pitchFamily="34" charset="0"/>
+                <a:cs typeface="Calibri" panose="020F0502020204030204" pitchFamily="34" charset="0"/>
+              </a:rPr>
+              <a:t>setpoint</a:t>
+            </a:r>
+            <a:endParaRPr lang="zh-CN" altLang="en-US" sz="1200" dirty="0">
+              <a:latin typeface="Calibri" panose="020F0502020204030204" pitchFamily="34" charset="0"/>
+              <a:cs typeface="Calibri" panose="020F0502020204030204" pitchFamily="34" charset="0"/>
+            </a:endParaRPr>
+          </a:p>
+        </p:txBody>
+      </p:sp>
+      <p:sp>
+        <p:nvSpPr>
+          <p:cNvPr id="39" name="圆角矩形 38"/>
+          <p:cNvSpPr/>
+          <p:nvPr/>
+        </p:nvSpPr>
+        <p:spPr>
+          <a:xfrm>
+            <a:off x="1914345" y="2014816"/>
+            <a:ext cx="507801" cy="1257544"/>
+          </a:xfrm>
+          <a:prstGeom prst="roundRect">
+            <a:avLst/>
+          </a:prstGeom>
+        </p:spPr>
+        <p:style>
+          <a:lnRef idx="2">
+            <a:schemeClr val="accent1">
+              <a:shade val="50000"/>
+            </a:schemeClr>
+          </a:lnRef>
+          <a:fillRef idx="1">
+            <a:schemeClr val="accent1"/>
+          </a:fillRef>
+          <a:effectRef idx="0">
+            <a:schemeClr val="accent1"/>
+          </a:effectRef>
+          <a:fontRef idx="minor">
+            <a:schemeClr val="lt1"/>
+          </a:fontRef>
+        </p:style>
+        <p:txBody>
+          <a:bodyPr rtlCol="0" anchor="ctr"/>
+          <a:lstStyle/>
+          <a:p>
+            <a:pPr algn="ctr"/>
+            <a:r>
+              <a:rPr lang="en-US" altLang="zh-CN" sz="1200" dirty="0" smtClean="0"/>
+              <a:t>TD</a:t>
+            </a:r>
+          </a:p>
+        </p:txBody>
+      </p:sp>
+      <p:cxnSp>
+        <p:nvCxnSpPr>
+          <p:cNvPr id="37" name="直接箭头连接符 36"/>
+          <p:cNvCxnSpPr>
+            <a:endCxn id="106" idx="2"/>
+          </p:cNvCxnSpPr>
+          <p:nvPr/>
+        </p:nvCxnSpPr>
+        <p:spPr>
+          <a:xfrm>
+            <a:off x="2428418" y="2951843"/>
+            <a:ext cx="522321" cy="507"/>
+          </a:xfrm>
+          <a:prstGeom prst="straightConnector1">
+            <a:avLst/>
+          </a:prstGeom>
+          <a:ln>
+            <a:tailEnd type="triangle"/>
+          </a:ln>
+        </p:spPr>
+        <p:style>
+          <a:lnRef idx="1">
+            <a:schemeClr val="accent1"/>
+          </a:lnRef>
+          <a:fillRef idx="0">
+            <a:schemeClr val="accent1"/>
+          </a:fillRef>
+          <a:effectRef idx="0">
+            <a:schemeClr val="accent1"/>
+          </a:effectRef>
+          <a:fontRef idx="minor">
+            <a:schemeClr val="tx1"/>
+          </a:fontRef>
+        </p:style>
+      </p:cxnSp>
+      <p:sp>
+        <p:nvSpPr>
+          <p:cNvPr id="203" name="文本框 202"/>
+          <p:cNvSpPr txBox="1"/>
+          <p:nvPr/>
+        </p:nvSpPr>
+        <p:spPr>
+          <a:xfrm>
+            <a:off x="2551452" y="2116892"/>
+            <a:ext cx="475171" cy="276999"/>
+          </a:xfrm>
+          <a:prstGeom prst="rect">
+            <a:avLst/>
+          </a:prstGeom>
+          <a:noFill/>
+        </p:spPr>
+        <p:txBody>
+          <a:bodyPr wrap="square" rtlCol="0">
+            <a:spAutoFit/>
+          </a:bodyPr>
+          <a:lstStyle/>
+          <a:p>
+            <a:r>
+              <a:rPr lang="en-US" altLang="zh-CN" sz="1200" dirty="0" smtClean="0">
+                <a:latin typeface="Calibri" panose="020F0502020204030204" pitchFamily="34" charset="0"/>
+                <a:cs typeface="Calibri" panose="020F0502020204030204" pitchFamily="34" charset="0"/>
+              </a:rPr>
+              <a:t>Z_d</a:t>
+            </a:r>
+            <a:endParaRPr lang="zh-CN" altLang="en-US" sz="1200" dirty="0">
+              <a:latin typeface="Calibri" panose="020F0502020204030204" pitchFamily="34" charset="0"/>
+              <a:cs typeface="Calibri" panose="020F0502020204030204" pitchFamily="34" charset="0"/>
+            </a:endParaRPr>
+          </a:p>
+        </p:txBody>
+      </p:sp>
+      <p:sp>
+        <p:nvSpPr>
+          <p:cNvPr id="204" name="文本框 203"/>
+          <p:cNvSpPr txBox="1"/>
+          <p:nvPr/>
+        </p:nvSpPr>
+        <p:spPr>
+          <a:xfrm>
+            <a:off x="2424192" y="2715404"/>
+            <a:ext cx="642102" cy="276999"/>
+          </a:xfrm>
+          <a:prstGeom prst="rect">
+            <a:avLst/>
+          </a:prstGeom>
+          <a:noFill/>
+        </p:spPr>
+        <p:txBody>
+          <a:bodyPr wrap="square" rtlCol="0">
+            <a:spAutoFit/>
+          </a:bodyPr>
+          <a:lstStyle/>
+          <a:p>
+            <a:r>
+              <a:rPr lang="en-US" altLang="zh-CN" sz="1200" dirty="0" smtClean="0">
+                <a:latin typeface="Calibri" panose="020F0502020204030204" pitchFamily="34" charset="0"/>
+                <a:cs typeface="Calibri" panose="020F0502020204030204" pitchFamily="34" charset="0"/>
+              </a:rPr>
+              <a:t>VZ_d</a:t>
+            </a:r>
+            <a:endParaRPr lang="zh-CN" altLang="en-US" sz="1200" dirty="0">
+              <a:latin typeface="Calibri" panose="020F0502020204030204" pitchFamily="34" charset="0"/>
+              <a:cs typeface="Calibri" panose="020F0502020204030204" pitchFamily="34" charset="0"/>
+            </a:endParaRPr>
+          </a:p>
+        </p:txBody>
+      </p:sp>
+      <p:sp>
+        <p:nvSpPr>
+          <p:cNvPr id="228" name="圆角矩形 227"/>
+          <p:cNvSpPr/>
+          <p:nvPr/>
+        </p:nvSpPr>
+        <p:spPr>
+          <a:xfrm>
+            <a:off x="360218" y="304800"/>
+            <a:ext cx="3210016" cy="905163"/>
+          </a:xfrm>
+          <a:prstGeom prst="roundRect">
+            <a:avLst/>
+          </a:prstGeom>
+          <a:solidFill>
+            <a:srgbClr val="FF0000"/>
+          </a:solidFill>
+        </p:spPr>
+        <p:style>
+          <a:lnRef idx="2">
+            <a:schemeClr val="accent1">
+              <a:shade val="50000"/>
+            </a:schemeClr>
+          </a:lnRef>
+          <a:fillRef idx="1">
+            <a:schemeClr val="accent1"/>
+          </a:fillRef>
+          <a:effectRef idx="0">
+            <a:schemeClr val="accent1"/>
+          </a:effectRef>
+          <a:fontRef idx="minor">
+            <a:schemeClr val="lt1"/>
+          </a:fontRef>
+        </p:style>
+        <p:txBody>
+          <a:bodyPr rtlCol="0" anchor="ctr"/>
+          <a:lstStyle/>
+          <a:p>
+            <a:pPr algn="ctr"/>
+            <a:r>
+              <a:rPr lang="en-US" altLang="zh-CN" dirty="0" smtClean="0"/>
+              <a:t>The control block diagram</a:t>
+            </a:r>
+          </a:p>
+          <a:p>
+            <a:pPr algn="ctr"/>
+            <a:r>
+              <a:rPr lang="en-US" altLang="zh-CN" dirty="0" smtClean="0"/>
+              <a:t> in this program</a:t>
+            </a:r>
+            <a:endParaRPr lang="zh-CN" altLang="en-US" dirty="0"/>
+          </a:p>
+        </p:txBody>
+      </p:sp>
+      <p:cxnSp>
+        <p:nvCxnSpPr>
+          <p:cNvPr id="6" name="直接箭头连接符 5"/>
+          <p:cNvCxnSpPr>
+            <a:endCxn id="103" idx="2"/>
+          </p:cNvCxnSpPr>
+          <p:nvPr/>
+        </p:nvCxnSpPr>
+        <p:spPr>
+          <a:xfrm>
+            <a:off x="2423924" y="2339041"/>
+            <a:ext cx="791028" cy="0"/>
+          </a:xfrm>
+          <a:prstGeom prst="straightConnector1">
+            <a:avLst/>
+          </a:prstGeom>
+          <a:ln>
+            <a:tailEnd type="triangle"/>
+          </a:ln>
+        </p:spPr>
+        <p:style>
+          <a:lnRef idx="1">
+            <a:schemeClr val="accent1"/>
+          </a:lnRef>
+          <a:fillRef idx="0">
+            <a:schemeClr val="accent1"/>
+          </a:fillRef>
+          <a:effectRef idx="0">
+            <a:schemeClr val="accent1"/>
+          </a:effectRef>
+          <a:fontRef idx="minor">
+            <a:schemeClr val="tx1"/>
+          </a:fontRef>
+        </p:style>
+      </p:cxnSp>
+      <p:sp>
+        <p:nvSpPr>
+          <p:cNvPr id="101" name="圆角矩形 100"/>
+          <p:cNvSpPr/>
+          <p:nvPr/>
+        </p:nvSpPr>
+        <p:spPr>
+          <a:xfrm>
+            <a:off x="3664373" y="2003085"/>
+            <a:ext cx="555712" cy="1269275"/>
+          </a:xfrm>
+          <a:prstGeom prst="roundRect">
+            <a:avLst/>
+          </a:prstGeom>
+        </p:spPr>
+        <p:style>
+          <a:lnRef idx="2">
+            <a:schemeClr val="accent1">
+              <a:shade val="50000"/>
+            </a:schemeClr>
+          </a:lnRef>
+          <a:fillRef idx="1">
+            <a:schemeClr val="accent1"/>
+          </a:fillRef>
+          <a:effectRef idx="0">
+            <a:schemeClr val="accent1"/>
+          </a:effectRef>
+          <a:fontRef idx="minor">
+            <a:schemeClr val="lt1"/>
+          </a:fontRef>
+        </p:style>
+        <p:txBody>
+          <a:bodyPr vert="eaVert" rtlCol="0" anchor="ctr"/>
+          <a:lstStyle/>
+          <a:p>
+            <a:pPr algn="ctr"/>
+            <a:r>
+              <a:rPr lang="en-US" altLang="zh-CN" sz="1200" dirty="0" smtClean="0"/>
+              <a:t>PID_Z</a:t>
+            </a:r>
+          </a:p>
+        </p:txBody>
+      </p:sp>
+      <p:sp>
+        <p:nvSpPr>
+          <p:cNvPr id="103" name="流程图: 接点 102"/>
+          <p:cNvSpPr/>
+          <p:nvPr/>
+        </p:nvSpPr>
+        <p:spPr>
+          <a:xfrm>
+            <a:off x="3214952" y="2241387"/>
+            <a:ext cx="195308" cy="195308"/>
+          </a:xfrm>
+          <a:prstGeom prst="flowChartConnector">
+            <a:avLst/>
+          </a:prstGeom>
+          <a:noFill/>
+          <a:ln>
+            <a:solidFill>
+              <a:schemeClr val="accent1"/>
+            </a:solidFill>
+          </a:ln>
+        </p:spPr>
+        <p:style>
+          <a:lnRef idx="2">
+            <a:schemeClr val="accent1">
+              <a:shade val="50000"/>
+            </a:schemeClr>
+          </a:lnRef>
+          <a:fillRef idx="1">
+            <a:schemeClr val="accent1"/>
+          </a:fillRef>
+          <a:effectRef idx="0">
+            <a:schemeClr val="accent1"/>
+          </a:effectRef>
+          <a:fontRef idx="minor">
+            <a:schemeClr val="lt1"/>
+          </a:fontRef>
+        </p:style>
+        <p:txBody>
+          <a:bodyPr rtlCol="0" anchor="ctr"/>
+          <a:lstStyle/>
+          <a:p>
+            <a:pPr algn="ctr"/>
+            <a:endParaRPr lang="zh-CN" altLang="en-US"/>
+          </a:p>
+        </p:txBody>
+      </p:sp>
+      <p:sp>
+        <p:nvSpPr>
+          <p:cNvPr id="104" name="加号 103"/>
+          <p:cNvSpPr/>
+          <p:nvPr/>
+        </p:nvSpPr>
+        <p:spPr>
+          <a:xfrm>
+            <a:off x="3148861" y="2197299"/>
+            <a:ext cx="90000" cy="88174"/>
+          </a:xfrm>
+          <a:prstGeom prst="mathPlus">
+            <a:avLst/>
+          </a:prstGeom>
+          <a:ln w="0">
+            <a:noFill/>
+          </a:ln>
+        </p:spPr>
+        <p:style>
+          <a:lnRef idx="2">
+            <a:schemeClr val="accent1">
+              <a:shade val="50000"/>
+            </a:schemeClr>
+          </a:lnRef>
+          <a:fillRef idx="1">
+            <a:schemeClr val="accent1"/>
+          </a:fillRef>
+          <a:effectRef idx="0">
+            <a:schemeClr val="accent1"/>
+          </a:effectRef>
+          <a:fontRef idx="minor">
+            <a:schemeClr val="lt1"/>
+          </a:fontRef>
+        </p:style>
+        <p:txBody>
+          <a:bodyPr rtlCol="0" anchor="ctr"/>
+          <a:lstStyle/>
+          <a:p>
+            <a:pPr algn="ctr"/>
+            <a:endParaRPr lang="zh-CN" altLang="en-US"/>
+          </a:p>
+        </p:txBody>
+      </p:sp>
+      <p:sp>
+        <p:nvSpPr>
+          <p:cNvPr id="105" name="减号 104"/>
+          <p:cNvSpPr/>
+          <p:nvPr/>
+        </p:nvSpPr>
+        <p:spPr>
+          <a:xfrm>
+            <a:off x="3361645" y="2442927"/>
+            <a:ext cx="90000" cy="90000"/>
+          </a:xfrm>
+          <a:prstGeom prst="mathMinus">
+            <a:avLst/>
+          </a:prstGeom>
+          <a:ln>
+            <a:noFill/>
+          </a:ln>
+        </p:spPr>
+        <p:style>
+          <a:lnRef idx="2">
+            <a:schemeClr val="accent1">
+              <a:shade val="50000"/>
+            </a:schemeClr>
+          </a:lnRef>
+          <a:fillRef idx="1">
+            <a:schemeClr val="accent1"/>
+          </a:fillRef>
+          <a:effectRef idx="0">
+            <a:schemeClr val="accent1"/>
+          </a:effectRef>
+          <a:fontRef idx="minor">
+            <a:schemeClr val="lt1"/>
+          </a:fontRef>
+        </p:style>
+        <p:txBody>
+          <a:bodyPr rtlCol="0" anchor="ctr"/>
+          <a:lstStyle/>
+          <a:p>
+            <a:pPr algn="ctr"/>
+            <a:endParaRPr lang="zh-CN" altLang="en-US"/>
+          </a:p>
+        </p:txBody>
+      </p:sp>
+      <p:sp>
+        <p:nvSpPr>
+          <p:cNvPr id="106" name="流程图: 接点 105"/>
+          <p:cNvSpPr/>
+          <p:nvPr/>
+        </p:nvSpPr>
+        <p:spPr>
+          <a:xfrm>
+            <a:off x="2950739" y="2854696"/>
+            <a:ext cx="195308" cy="195308"/>
+          </a:xfrm>
+          <a:prstGeom prst="flowChartConnector">
+            <a:avLst/>
+          </a:prstGeom>
+          <a:noFill/>
+          <a:ln>
+            <a:solidFill>
+              <a:schemeClr val="accent1"/>
+            </a:solidFill>
+          </a:ln>
+        </p:spPr>
+        <p:style>
+          <a:lnRef idx="2">
+            <a:schemeClr val="accent1">
+              <a:shade val="50000"/>
+            </a:schemeClr>
+          </a:lnRef>
+          <a:fillRef idx="1">
+            <a:schemeClr val="accent1"/>
+          </a:fillRef>
+          <a:effectRef idx="0">
+            <a:schemeClr val="accent1"/>
+          </a:effectRef>
+          <a:fontRef idx="minor">
+            <a:schemeClr val="lt1"/>
+          </a:fontRef>
+        </p:style>
+        <p:txBody>
+          <a:bodyPr rtlCol="0" anchor="ctr"/>
+          <a:lstStyle/>
+          <a:p>
+            <a:pPr algn="ctr"/>
+            <a:endParaRPr lang="zh-CN" altLang="en-US"/>
+          </a:p>
+        </p:txBody>
+      </p:sp>
+      <p:sp>
+        <p:nvSpPr>
+          <p:cNvPr id="107" name="加号 106"/>
+          <p:cNvSpPr/>
+          <p:nvPr/>
+        </p:nvSpPr>
+        <p:spPr>
+          <a:xfrm>
+            <a:off x="2879620" y="2808510"/>
+            <a:ext cx="90000" cy="88174"/>
+          </a:xfrm>
+          <a:prstGeom prst="mathPlus">
+            <a:avLst/>
+          </a:prstGeom>
+          <a:ln w="0">
+            <a:noFill/>
+          </a:ln>
+        </p:spPr>
+        <p:style>
+          <a:lnRef idx="2">
+            <a:schemeClr val="accent1">
+              <a:shade val="50000"/>
+            </a:schemeClr>
+          </a:lnRef>
+          <a:fillRef idx="1">
+            <a:schemeClr val="accent1"/>
+          </a:fillRef>
+          <a:effectRef idx="0">
+            <a:schemeClr val="accent1"/>
+          </a:effectRef>
+          <a:fontRef idx="minor">
+            <a:schemeClr val="lt1"/>
+          </a:fontRef>
+        </p:style>
+        <p:txBody>
+          <a:bodyPr rtlCol="0" anchor="ctr"/>
+          <a:lstStyle/>
+          <a:p>
+            <a:pPr algn="ctr"/>
+            <a:endParaRPr lang="zh-CN" altLang="en-US"/>
+          </a:p>
+        </p:txBody>
+      </p:sp>
+      <p:sp>
+        <p:nvSpPr>
+          <p:cNvPr id="108" name="减号 107"/>
+          <p:cNvSpPr/>
+          <p:nvPr/>
+        </p:nvSpPr>
+        <p:spPr>
+          <a:xfrm>
+            <a:off x="3077144" y="3054980"/>
+            <a:ext cx="90000" cy="90000"/>
+          </a:xfrm>
+          <a:prstGeom prst="mathMinus">
+            <a:avLst/>
+          </a:prstGeom>
+          <a:ln>
+            <a:noFill/>
+          </a:ln>
+        </p:spPr>
+        <p:style>
+          <a:lnRef idx="2">
+            <a:schemeClr val="accent1">
+              <a:shade val="50000"/>
+            </a:schemeClr>
+          </a:lnRef>
+          <a:fillRef idx="1">
+            <a:schemeClr val="accent1"/>
+          </a:fillRef>
+          <a:effectRef idx="0">
+            <a:schemeClr val="accent1"/>
+          </a:effectRef>
+          <a:fontRef idx="minor">
+            <a:schemeClr val="lt1"/>
+          </a:fontRef>
+        </p:style>
+        <p:txBody>
+          <a:bodyPr rtlCol="0" anchor="ctr"/>
+          <a:lstStyle/>
+          <a:p>
+            <a:pPr algn="ctr"/>
+            <a:endParaRPr lang="zh-CN" altLang="en-US"/>
+          </a:p>
+        </p:txBody>
+      </p:sp>
+      <p:sp>
+        <p:nvSpPr>
+          <p:cNvPr id="109" name="圆角矩形 108"/>
+          <p:cNvSpPr/>
+          <p:nvPr/>
+        </p:nvSpPr>
+        <p:spPr>
+          <a:xfrm>
+            <a:off x="4823473" y="2013846"/>
+            <a:ext cx="515382" cy="1245814"/>
+          </a:xfrm>
+          <a:prstGeom prst="roundRect">
+            <a:avLst/>
+          </a:prstGeom>
+        </p:spPr>
+        <p:style>
+          <a:lnRef idx="2">
+            <a:schemeClr val="accent1">
+              <a:shade val="50000"/>
+            </a:schemeClr>
+          </a:lnRef>
+          <a:fillRef idx="1">
+            <a:schemeClr val="accent1"/>
+          </a:fillRef>
+          <a:effectRef idx="0">
+            <a:schemeClr val="accent1"/>
+          </a:effectRef>
+          <a:fontRef idx="minor">
+            <a:schemeClr val="lt1"/>
+          </a:fontRef>
+        </p:style>
+        <p:txBody>
+          <a:bodyPr rtlCol="0" anchor="ctr"/>
+          <a:lstStyle/>
+          <a:p>
+            <a:pPr algn="ctr"/>
+            <a:r>
+              <a:rPr lang="en-US" altLang="zh-CN" sz="1200" dirty="0" smtClean="0"/>
+              <a:t>TD</a:t>
+            </a:r>
+          </a:p>
+        </p:txBody>
+      </p:sp>
+      <p:sp>
+        <p:nvSpPr>
+          <p:cNvPr id="112" name="文本框 111"/>
+          <p:cNvSpPr txBox="1"/>
+          <p:nvPr/>
+        </p:nvSpPr>
+        <p:spPr>
+          <a:xfrm>
+            <a:off x="5272288" y="2118675"/>
+            <a:ext cx="577098" cy="276999"/>
+          </a:xfrm>
+          <a:prstGeom prst="rect">
+            <a:avLst/>
+          </a:prstGeom>
+          <a:noFill/>
+        </p:spPr>
+        <p:txBody>
+          <a:bodyPr wrap="square" rtlCol="0">
+            <a:spAutoFit/>
+          </a:bodyPr>
+          <a:lstStyle/>
+          <a:p>
+            <a:r>
+              <a:rPr lang="en-US" altLang="zh-CN" sz="1200" dirty="0" smtClean="0">
+                <a:latin typeface="Calibri" panose="020F0502020204030204" pitchFamily="34" charset="0"/>
+                <a:cs typeface="Calibri" panose="020F0502020204030204" pitchFamily="34" charset="0"/>
+              </a:rPr>
+              <a:t>VZ_d’</a:t>
+            </a:r>
+            <a:endParaRPr lang="zh-CN" altLang="en-US" sz="1200" dirty="0">
+              <a:latin typeface="Calibri" panose="020F0502020204030204" pitchFamily="34" charset="0"/>
+              <a:cs typeface="Calibri" panose="020F0502020204030204" pitchFamily="34" charset="0"/>
+            </a:endParaRPr>
+          </a:p>
+        </p:txBody>
+      </p:sp>
+      <p:sp>
+        <p:nvSpPr>
+          <p:cNvPr id="113" name="文本框 112"/>
+          <p:cNvSpPr txBox="1"/>
+          <p:nvPr/>
+        </p:nvSpPr>
+        <p:spPr>
+          <a:xfrm>
+            <a:off x="5277285" y="2684173"/>
+            <a:ext cx="642102" cy="276999"/>
+          </a:xfrm>
+          <a:prstGeom prst="rect">
+            <a:avLst/>
+          </a:prstGeom>
+          <a:noFill/>
+        </p:spPr>
+        <p:txBody>
+          <a:bodyPr wrap="square" rtlCol="0">
+            <a:spAutoFit/>
+          </a:bodyPr>
+          <a:lstStyle/>
+          <a:p>
+            <a:r>
+              <a:rPr lang="en-US" altLang="zh-CN" sz="1200" dirty="0" smtClean="0">
+                <a:latin typeface="Calibri" panose="020F0502020204030204" pitchFamily="34" charset="0"/>
+                <a:cs typeface="Calibri" panose="020F0502020204030204" pitchFamily="34" charset="0"/>
+              </a:rPr>
+              <a:t>aZ_d</a:t>
+            </a:r>
+            <a:endParaRPr lang="zh-CN" altLang="en-US" sz="1200" dirty="0">
+              <a:latin typeface="Calibri" panose="020F0502020204030204" pitchFamily="34" charset="0"/>
+              <a:cs typeface="Calibri" panose="020F0502020204030204" pitchFamily="34" charset="0"/>
+            </a:endParaRPr>
+          </a:p>
+        </p:txBody>
+      </p:sp>
+      <p:cxnSp>
+        <p:nvCxnSpPr>
+          <p:cNvPr id="114" name="直接箭头连接符 113"/>
+          <p:cNvCxnSpPr/>
+          <p:nvPr/>
+        </p:nvCxnSpPr>
+        <p:spPr>
+          <a:xfrm>
+            <a:off x="5334004" y="2346690"/>
+            <a:ext cx="670249" cy="0"/>
+          </a:xfrm>
+          <a:prstGeom prst="straightConnector1">
+            <a:avLst/>
+          </a:prstGeom>
+          <a:ln>
+            <a:tailEnd type="triangle"/>
+          </a:ln>
+        </p:spPr>
+        <p:style>
+          <a:lnRef idx="1">
+            <a:schemeClr val="accent1"/>
+          </a:lnRef>
+          <a:fillRef idx="0">
+            <a:schemeClr val="accent1"/>
+          </a:fillRef>
+          <a:effectRef idx="0">
+            <a:schemeClr val="accent1"/>
+          </a:effectRef>
+          <a:fontRef idx="minor">
+            <a:schemeClr val="tx1"/>
+          </a:fontRef>
+        </p:style>
+      </p:cxnSp>
+      <p:sp>
+        <p:nvSpPr>
+          <p:cNvPr id="115" name="流程图: 接点 114"/>
+          <p:cNvSpPr/>
+          <p:nvPr/>
+        </p:nvSpPr>
+        <p:spPr>
+          <a:xfrm>
+            <a:off x="6014222" y="2248530"/>
+            <a:ext cx="195308" cy="195308"/>
+          </a:xfrm>
+          <a:prstGeom prst="flowChartConnector">
+            <a:avLst/>
+          </a:prstGeom>
+          <a:noFill/>
+          <a:ln>
+            <a:solidFill>
+              <a:schemeClr val="accent1"/>
+            </a:solidFill>
+          </a:ln>
+        </p:spPr>
+        <p:style>
+          <a:lnRef idx="2">
+            <a:schemeClr val="accent1">
+              <a:shade val="50000"/>
+            </a:schemeClr>
+          </a:lnRef>
+          <a:fillRef idx="1">
+            <a:schemeClr val="accent1"/>
+          </a:fillRef>
+          <a:effectRef idx="0">
+            <a:schemeClr val="accent1"/>
+          </a:effectRef>
+          <a:fontRef idx="minor">
+            <a:schemeClr val="lt1"/>
+          </a:fontRef>
+        </p:style>
+        <p:txBody>
+          <a:bodyPr rtlCol="0" anchor="ctr"/>
+          <a:lstStyle/>
+          <a:p>
+            <a:pPr algn="ctr"/>
+            <a:endParaRPr lang="zh-CN" altLang="en-US"/>
+          </a:p>
+        </p:txBody>
+      </p:sp>
+      <p:sp>
+        <p:nvSpPr>
+          <p:cNvPr id="116" name="加号 115"/>
+          <p:cNvSpPr/>
+          <p:nvPr/>
+        </p:nvSpPr>
+        <p:spPr>
+          <a:xfrm>
+            <a:off x="5948131" y="2190156"/>
+            <a:ext cx="90000" cy="88174"/>
+          </a:xfrm>
+          <a:prstGeom prst="mathPlus">
+            <a:avLst/>
+          </a:prstGeom>
+          <a:ln w="0">
+            <a:noFill/>
+          </a:ln>
+        </p:spPr>
+        <p:style>
+          <a:lnRef idx="2">
+            <a:schemeClr val="accent1">
+              <a:shade val="50000"/>
+            </a:schemeClr>
+          </a:lnRef>
+          <a:fillRef idx="1">
+            <a:schemeClr val="accent1"/>
+          </a:fillRef>
+          <a:effectRef idx="0">
+            <a:schemeClr val="accent1"/>
+          </a:effectRef>
+          <a:fontRef idx="minor">
+            <a:schemeClr val="lt1"/>
+          </a:fontRef>
+        </p:style>
+        <p:txBody>
+          <a:bodyPr rtlCol="0" anchor="ctr"/>
+          <a:lstStyle/>
+          <a:p>
+            <a:pPr algn="ctr"/>
+            <a:endParaRPr lang="zh-CN" altLang="en-US"/>
+          </a:p>
+        </p:txBody>
+      </p:sp>
+      <p:sp>
+        <p:nvSpPr>
+          <p:cNvPr id="117" name="减号 116"/>
+          <p:cNvSpPr/>
+          <p:nvPr/>
+        </p:nvSpPr>
+        <p:spPr>
+          <a:xfrm>
+            <a:off x="6160915" y="2435784"/>
+            <a:ext cx="90000" cy="90000"/>
+          </a:xfrm>
+          <a:prstGeom prst="mathMinus">
+            <a:avLst/>
+          </a:prstGeom>
+          <a:ln>
+            <a:noFill/>
+          </a:ln>
+        </p:spPr>
+        <p:style>
+          <a:lnRef idx="2">
+            <a:schemeClr val="accent1">
+              <a:shade val="50000"/>
+            </a:schemeClr>
+          </a:lnRef>
+          <a:fillRef idx="1">
+            <a:schemeClr val="accent1"/>
+          </a:fillRef>
+          <a:effectRef idx="0">
+            <a:schemeClr val="accent1"/>
+          </a:effectRef>
+          <a:fontRef idx="minor">
+            <a:schemeClr val="lt1"/>
+          </a:fontRef>
+        </p:style>
+        <p:txBody>
+          <a:bodyPr rtlCol="0" anchor="ctr"/>
+          <a:lstStyle/>
+          <a:p>
+            <a:pPr algn="ctr"/>
+            <a:endParaRPr lang="zh-CN" altLang="en-US"/>
+          </a:p>
+        </p:txBody>
+      </p:sp>
+      <p:sp>
+        <p:nvSpPr>
+          <p:cNvPr id="118" name="流程图: 接点 117"/>
+          <p:cNvSpPr/>
+          <p:nvPr/>
+        </p:nvSpPr>
+        <p:spPr>
+          <a:xfrm>
+            <a:off x="5750009" y="2854696"/>
+            <a:ext cx="195308" cy="195308"/>
+          </a:xfrm>
+          <a:prstGeom prst="flowChartConnector">
+            <a:avLst/>
+          </a:prstGeom>
+          <a:noFill/>
+          <a:ln>
+            <a:solidFill>
+              <a:schemeClr val="accent1"/>
+            </a:solidFill>
+          </a:ln>
+        </p:spPr>
+        <p:style>
+          <a:lnRef idx="2">
+            <a:schemeClr val="accent1">
+              <a:shade val="50000"/>
+            </a:schemeClr>
+          </a:lnRef>
+          <a:fillRef idx="1">
+            <a:schemeClr val="accent1"/>
+          </a:fillRef>
+          <a:effectRef idx="0">
+            <a:schemeClr val="accent1"/>
+          </a:effectRef>
+          <a:fontRef idx="minor">
+            <a:schemeClr val="lt1"/>
+          </a:fontRef>
+        </p:style>
+        <p:txBody>
+          <a:bodyPr rtlCol="0" anchor="ctr"/>
+          <a:lstStyle/>
+          <a:p>
+            <a:pPr algn="ctr"/>
+            <a:endParaRPr lang="zh-CN" altLang="en-US"/>
+          </a:p>
+        </p:txBody>
+      </p:sp>
+      <p:sp>
+        <p:nvSpPr>
+          <p:cNvPr id="119" name="加号 118"/>
+          <p:cNvSpPr/>
+          <p:nvPr/>
+        </p:nvSpPr>
+        <p:spPr>
+          <a:xfrm>
+            <a:off x="5678890" y="2808510"/>
+            <a:ext cx="90000" cy="88174"/>
+          </a:xfrm>
+          <a:prstGeom prst="mathPlus">
+            <a:avLst/>
+          </a:prstGeom>
+          <a:ln w="0">
+            <a:noFill/>
+          </a:ln>
+        </p:spPr>
+        <p:style>
+          <a:lnRef idx="2">
+            <a:schemeClr val="accent1">
+              <a:shade val="50000"/>
+            </a:schemeClr>
+          </a:lnRef>
+          <a:fillRef idx="1">
+            <a:schemeClr val="accent1"/>
+          </a:fillRef>
+          <a:effectRef idx="0">
+            <a:schemeClr val="accent1"/>
+          </a:effectRef>
+          <a:fontRef idx="minor">
+            <a:schemeClr val="lt1"/>
+          </a:fontRef>
+        </p:style>
+        <p:txBody>
+          <a:bodyPr rtlCol="0" anchor="ctr"/>
+          <a:lstStyle/>
+          <a:p>
+            <a:pPr algn="ctr"/>
+            <a:endParaRPr lang="zh-CN" altLang="en-US"/>
+          </a:p>
+        </p:txBody>
+      </p:sp>
+      <p:sp>
+        <p:nvSpPr>
+          <p:cNvPr id="120" name="减号 119"/>
+          <p:cNvSpPr/>
+          <p:nvPr/>
+        </p:nvSpPr>
+        <p:spPr>
+          <a:xfrm>
+            <a:off x="5876414" y="3054980"/>
+            <a:ext cx="90000" cy="90000"/>
+          </a:xfrm>
+          <a:prstGeom prst="mathMinus">
+            <a:avLst/>
+          </a:prstGeom>
+          <a:ln>
+            <a:noFill/>
+          </a:ln>
+        </p:spPr>
+        <p:style>
+          <a:lnRef idx="2">
+            <a:schemeClr val="accent1">
+              <a:shade val="50000"/>
+            </a:schemeClr>
+          </a:lnRef>
+          <a:fillRef idx="1">
+            <a:schemeClr val="accent1"/>
+          </a:fillRef>
+          <a:effectRef idx="0">
+            <a:schemeClr val="accent1"/>
+          </a:effectRef>
+          <a:fontRef idx="minor">
+            <a:schemeClr val="lt1"/>
+          </a:fontRef>
+        </p:style>
+        <p:txBody>
+          <a:bodyPr rtlCol="0" anchor="ctr"/>
+          <a:lstStyle/>
+          <a:p>
+            <a:pPr algn="ctr"/>
+            <a:endParaRPr lang="zh-CN" altLang="en-US"/>
+          </a:p>
+        </p:txBody>
+      </p:sp>
+      <p:cxnSp>
+        <p:nvCxnSpPr>
+          <p:cNvPr id="14" name="直接箭头连接符 13"/>
+          <p:cNvCxnSpPr>
+            <a:endCxn id="118" idx="2"/>
+          </p:cNvCxnSpPr>
+          <p:nvPr/>
+        </p:nvCxnSpPr>
+        <p:spPr>
+          <a:xfrm>
+            <a:off x="5348561" y="2951946"/>
+            <a:ext cx="401448" cy="404"/>
+          </a:xfrm>
+          <a:prstGeom prst="straightConnector1">
+            <a:avLst/>
+          </a:prstGeom>
+          <a:ln>
+            <a:tailEnd type="triangle"/>
+          </a:ln>
+        </p:spPr>
+        <p:style>
+          <a:lnRef idx="1">
+            <a:schemeClr val="accent1"/>
+          </a:lnRef>
+          <a:fillRef idx="0">
+            <a:schemeClr val="accent1"/>
+          </a:fillRef>
+          <a:effectRef idx="0">
+            <a:schemeClr val="accent1"/>
+          </a:effectRef>
+          <a:fontRef idx="minor">
+            <a:schemeClr val="tx1"/>
+          </a:fontRef>
+        </p:style>
+      </p:cxnSp>
+      <p:sp>
+        <p:nvSpPr>
+          <p:cNvPr id="134" name="圆角矩形 133"/>
+          <p:cNvSpPr/>
+          <p:nvPr/>
+        </p:nvSpPr>
+        <p:spPr>
+          <a:xfrm>
+            <a:off x="6797804" y="1991353"/>
+            <a:ext cx="555712" cy="1269275"/>
+          </a:xfrm>
+          <a:prstGeom prst="roundRect">
+            <a:avLst/>
+          </a:prstGeom>
+        </p:spPr>
+        <p:style>
+          <a:lnRef idx="2">
+            <a:schemeClr val="accent1">
+              <a:shade val="50000"/>
+            </a:schemeClr>
+          </a:lnRef>
+          <a:fillRef idx="1">
+            <a:schemeClr val="accent1"/>
+          </a:fillRef>
+          <a:effectRef idx="0">
+            <a:schemeClr val="accent1"/>
+          </a:effectRef>
+          <a:fontRef idx="minor">
+            <a:schemeClr val="lt1"/>
+          </a:fontRef>
+        </p:style>
+        <p:txBody>
+          <a:bodyPr vert="eaVert" rtlCol="0" anchor="ctr"/>
+          <a:lstStyle/>
+          <a:p>
+            <a:pPr algn="ctr"/>
+            <a:r>
+              <a:rPr lang="en-US" altLang="zh-CN" sz="1200" dirty="0" smtClean="0"/>
+              <a:t>NLSEF_VZ</a:t>
+            </a:r>
+          </a:p>
+        </p:txBody>
+      </p:sp>
+      <p:sp>
+        <p:nvSpPr>
+          <p:cNvPr id="139" name="流程图: 接点 138"/>
+          <p:cNvSpPr/>
+          <p:nvPr/>
+        </p:nvSpPr>
+        <p:spPr>
+          <a:xfrm>
+            <a:off x="7781575" y="2531133"/>
+            <a:ext cx="195308" cy="195308"/>
+          </a:xfrm>
+          <a:prstGeom prst="flowChartConnector">
+            <a:avLst/>
+          </a:prstGeom>
+          <a:noFill/>
+          <a:ln>
+            <a:solidFill>
+              <a:schemeClr val="accent1"/>
+            </a:solidFill>
+          </a:ln>
+        </p:spPr>
+        <p:style>
+          <a:lnRef idx="2">
+            <a:schemeClr val="accent1">
+              <a:shade val="50000"/>
+            </a:schemeClr>
+          </a:lnRef>
+          <a:fillRef idx="1">
+            <a:schemeClr val="accent1"/>
+          </a:fillRef>
+          <a:effectRef idx="0">
+            <a:schemeClr val="accent1"/>
+          </a:effectRef>
+          <a:fontRef idx="minor">
+            <a:schemeClr val="lt1"/>
+          </a:fontRef>
+        </p:style>
+        <p:txBody>
+          <a:bodyPr rtlCol="0" anchor="ctr"/>
+          <a:lstStyle/>
+          <a:p>
+            <a:pPr algn="ctr"/>
+            <a:endParaRPr lang="zh-CN" altLang="en-US"/>
+          </a:p>
+        </p:txBody>
+      </p:sp>
+      <p:sp>
+        <p:nvSpPr>
+          <p:cNvPr id="146" name="加号 145"/>
+          <p:cNvSpPr/>
+          <p:nvPr/>
+        </p:nvSpPr>
+        <p:spPr>
+          <a:xfrm>
+            <a:off x="7715484" y="2487045"/>
+            <a:ext cx="90000" cy="88174"/>
+          </a:xfrm>
+          <a:prstGeom prst="mathPlus">
+            <a:avLst/>
+          </a:prstGeom>
+          <a:ln w="0">
+            <a:noFill/>
+          </a:ln>
+        </p:spPr>
+        <p:style>
+          <a:lnRef idx="2">
+            <a:schemeClr val="accent1">
+              <a:shade val="50000"/>
+            </a:schemeClr>
+          </a:lnRef>
+          <a:fillRef idx="1">
+            <a:schemeClr val="accent1"/>
+          </a:fillRef>
+          <a:effectRef idx="0">
+            <a:schemeClr val="accent1"/>
+          </a:effectRef>
+          <a:fontRef idx="minor">
+            <a:schemeClr val="lt1"/>
+          </a:fontRef>
+        </p:style>
+        <p:txBody>
+          <a:bodyPr rtlCol="0" anchor="ctr"/>
+          <a:lstStyle/>
+          <a:p>
+            <a:pPr algn="ctr"/>
+            <a:endParaRPr lang="zh-CN" altLang="en-US"/>
+          </a:p>
+        </p:txBody>
+      </p:sp>
+      <p:sp>
+        <p:nvSpPr>
+          <p:cNvPr id="148" name="减号 147"/>
+          <p:cNvSpPr/>
+          <p:nvPr/>
+        </p:nvSpPr>
+        <p:spPr>
+          <a:xfrm>
+            <a:off x="7928268" y="2732673"/>
+            <a:ext cx="90000" cy="90000"/>
+          </a:xfrm>
+          <a:prstGeom prst="mathMinus">
+            <a:avLst/>
+          </a:prstGeom>
+          <a:ln>
+            <a:noFill/>
+          </a:ln>
+        </p:spPr>
+        <p:style>
+          <a:lnRef idx="2">
+            <a:schemeClr val="accent1">
+              <a:shade val="50000"/>
+            </a:schemeClr>
+          </a:lnRef>
+          <a:fillRef idx="1">
+            <a:schemeClr val="accent1"/>
+          </a:fillRef>
+          <a:effectRef idx="0">
+            <a:schemeClr val="accent1"/>
+          </a:effectRef>
+          <a:fontRef idx="minor">
+            <a:schemeClr val="lt1"/>
+          </a:fontRef>
+        </p:style>
+        <p:txBody>
+          <a:bodyPr rtlCol="0" anchor="ctr"/>
+          <a:lstStyle/>
+          <a:p>
+            <a:pPr algn="ctr"/>
+            <a:endParaRPr lang="zh-CN" altLang="en-US"/>
+          </a:p>
+        </p:txBody>
+      </p:sp>
+      <p:sp>
+        <p:nvSpPr>
+          <p:cNvPr id="149" name="圆角矩形 148"/>
+          <p:cNvSpPr/>
+          <p:nvPr/>
+        </p:nvSpPr>
+        <p:spPr>
+          <a:xfrm>
+            <a:off x="7587955" y="3802374"/>
+            <a:ext cx="596951" cy="767175"/>
+          </a:xfrm>
+          <a:prstGeom prst="roundRect">
+            <a:avLst/>
+          </a:prstGeom>
+        </p:spPr>
+        <p:style>
+          <a:lnRef idx="2">
+            <a:schemeClr val="accent1">
+              <a:shade val="50000"/>
+            </a:schemeClr>
+          </a:lnRef>
+          <a:fillRef idx="1">
+            <a:schemeClr val="accent1"/>
+          </a:fillRef>
+          <a:effectRef idx="0">
+            <a:schemeClr val="accent1"/>
+          </a:effectRef>
+          <a:fontRef idx="minor">
+            <a:schemeClr val="lt1"/>
+          </a:fontRef>
+        </p:style>
+        <p:txBody>
+          <a:bodyPr rtlCol="0" anchor="ctr"/>
+          <a:lstStyle/>
+          <a:p>
+            <a:pPr algn="ctr"/>
+            <a:r>
+              <a:rPr lang="en-US" altLang="zh-CN" sz="1200" dirty="0" smtClean="0"/>
+              <a:t>ESO</a:t>
+            </a:r>
+          </a:p>
+        </p:txBody>
+      </p:sp>
+      <p:sp>
+        <p:nvSpPr>
+          <p:cNvPr id="150" name="圆角矩形 149"/>
+          <p:cNvSpPr/>
+          <p:nvPr/>
+        </p:nvSpPr>
+        <p:spPr>
+          <a:xfrm>
+            <a:off x="9191921" y="2399610"/>
+            <a:ext cx="548427" cy="452762"/>
+          </a:xfrm>
+          <a:prstGeom prst="roundRect">
+            <a:avLst/>
+          </a:prstGeom>
+        </p:spPr>
+        <p:style>
+          <a:lnRef idx="2">
+            <a:schemeClr val="accent1">
+              <a:shade val="50000"/>
+            </a:schemeClr>
+          </a:lnRef>
+          <a:fillRef idx="1">
+            <a:schemeClr val="accent1"/>
+          </a:fillRef>
+          <a:effectRef idx="0">
+            <a:schemeClr val="accent1"/>
+          </a:effectRef>
+          <a:fontRef idx="minor">
+            <a:schemeClr val="lt1"/>
+          </a:fontRef>
+        </p:style>
+        <p:txBody>
+          <a:bodyPr rtlCol="0" anchor="ctr"/>
+          <a:lstStyle/>
+          <a:p>
+            <a:pPr algn="ctr"/>
+            <a:r>
+              <a:rPr lang="en-US" altLang="zh-CN" sz="1200" dirty="0" smtClean="0"/>
+              <a:t>P</a:t>
+            </a:r>
+          </a:p>
+        </p:txBody>
+      </p:sp>
+      <p:cxnSp>
+        <p:nvCxnSpPr>
+          <p:cNvPr id="151" name="直接箭头连接符 150"/>
+          <p:cNvCxnSpPr/>
+          <p:nvPr/>
+        </p:nvCxnSpPr>
+        <p:spPr>
+          <a:xfrm>
+            <a:off x="9659386" y="2528338"/>
+            <a:ext cx="804863" cy="0"/>
+          </a:xfrm>
+          <a:prstGeom prst="straightConnector1">
+            <a:avLst/>
+          </a:prstGeom>
+          <a:ln>
+            <a:tailEnd type="triangle"/>
+          </a:ln>
+        </p:spPr>
+        <p:style>
+          <a:lnRef idx="1">
+            <a:schemeClr val="accent1"/>
+          </a:lnRef>
+          <a:fillRef idx="0">
+            <a:schemeClr val="accent1"/>
+          </a:fillRef>
+          <a:effectRef idx="0">
+            <a:schemeClr val="accent1"/>
+          </a:effectRef>
+          <a:fontRef idx="minor">
+            <a:schemeClr val="tx1"/>
+          </a:fontRef>
+        </p:style>
+      </p:cxnSp>
+      <p:cxnSp>
+        <p:nvCxnSpPr>
+          <p:cNvPr id="152" name="直接箭头连接符 151"/>
+          <p:cNvCxnSpPr/>
+          <p:nvPr/>
+        </p:nvCxnSpPr>
+        <p:spPr>
+          <a:xfrm>
+            <a:off x="9659386" y="2723738"/>
+            <a:ext cx="804863" cy="0"/>
+          </a:xfrm>
+          <a:prstGeom prst="straightConnector1">
+            <a:avLst/>
+          </a:prstGeom>
+          <a:ln>
+            <a:tailEnd type="triangle"/>
+          </a:ln>
+        </p:spPr>
+        <p:style>
+          <a:lnRef idx="1">
+            <a:schemeClr val="accent1"/>
+          </a:lnRef>
+          <a:fillRef idx="0">
+            <a:schemeClr val="accent1"/>
+          </a:fillRef>
+          <a:effectRef idx="0">
+            <a:schemeClr val="accent1"/>
+          </a:effectRef>
+          <a:fontRef idx="minor">
+            <a:schemeClr val="tx1"/>
+          </a:fontRef>
+        </p:style>
+      </p:cxnSp>
+      <p:sp>
+        <p:nvSpPr>
+          <p:cNvPr id="153" name="文本框 152"/>
+          <p:cNvSpPr txBox="1"/>
+          <p:nvPr/>
+        </p:nvSpPr>
+        <p:spPr>
+          <a:xfrm>
+            <a:off x="9659386" y="2304427"/>
+            <a:ext cx="1529564" cy="276999"/>
+          </a:xfrm>
+          <a:prstGeom prst="rect">
+            <a:avLst/>
+          </a:prstGeom>
+          <a:noFill/>
+        </p:spPr>
+        <p:txBody>
+          <a:bodyPr wrap="square" rtlCol="0">
+            <a:spAutoFit/>
+          </a:bodyPr>
+          <a:lstStyle/>
+          <a:p>
+            <a:r>
+              <a:rPr lang="en-US" altLang="zh-CN" sz="1200" dirty="0">
+                <a:latin typeface="Calibri" panose="020F0502020204030204" pitchFamily="34" charset="0"/>
+                <a:cs typeface="Calibri" panose="020F0502020204030204" pitchFamily="34" charset="0"/>
+              </a:rPr>
+              <a:t>State.position.z</a:t>
+            </a:r>
+            <a:endParaRPr lang="zh-CN" altLang="en-US" sz="1200" dirty="0">
+              <a:latin typeface="Calibri" panose="020F0502020204030204" pitchFamily="34" charset="0"/>
+              <a:cs typeface="Calibri" panose="020F0502020204030204" pitchFamily="34" charset="0"/>
+            </a:endParaRPr>
+          </a:p>
+        </p:txBody>
+      </p:sp>
+      <p:sp>
+        <p:nvSpPr>
+          <p:cNvPr id="154" name="文本框 153"/>
+          <p:cNvSpPr txBox="1"/>
+          <p:nvPr/>
+        </p:nvSpPr>
+        <p:spPr>
+          <a:xfrm>
+            <a:off x="9677403" y="2516682"/>
+            <a:ext cx="1224010" cy="276999"/>
+          </a:xfrm>
+          <a:prstGeom prst="rect">
+            <a:avLst/>
+          </a:prstGeom>
+          <a:noFill/>
+        </p:spPr>
+        <p:txBody>
+          <a:bodyPr wrap="square" rtlCol="0">
+            <a:spAutoFit/>
+          </a:bodyPr>
+          <a:lstStyle/>
+          <a:p>
+            <a:r>
+              <a:rPr lang="en-US" altLang="zh-CN" sz="1200" dirty="0">
+                <a:latin typeface="Calibri" panose="020F0502020204030204" pitchFamily="34" charset="0"/>
+                <a:cs typeface="Calibri" panose="020F0502020204030204" pitchFamily="34" charset="0"/>
+              </a:rPr>
+              <a:t>State.velocity.z</a:t>
+            </a:r>
+            <a:endParaRPr lang="zh-CN" altLang="en-US" sz="1200" dirty="0">
+              <a:latin typeface="Calibri" panose="020F0502020204030204" pitchFamily="34" charset="0"/>
+              <a:cs typeface="Calibri" panose="020F0502020204030204" pitchFamily="34" charset="0"/>
+            </a:endParaRPr>
+          </a:p>
+        </p:txBody>
+      </p:sp>
+      <p:cxnSp>
+        <p:nvCxnSpPr>
+          <p:cNvPr id="17" name="直接箭头连接符 16"/>
+          <p:cNvCxnSpPr>
+            <a:stCxn id="139" idx="6"/>
+            <a:endCxn id="323" idx="2"/>
+          </p:cNvCxnSpPr>
+          <p:nvPr/>
+        </p:nvCxnSpPr>
+        <p:spPr>
+          <a:xfrm flipV="1">
+            <a:off x="7976883" y="2623438"/>
+            <a:ext cx="740979" cy="5349"/>
+          </a:xfrm>
+          <a:prstGeom prst="straightConnector1">
+            <a:avLst/>
+          </a:prstGeom>
+          <a:ln>
+            <a:tailEnd type="triangle"/>
+          </a:ln>
+        </p:spPr>
+        <p:style>
+          <a:lnRef idx="1">
+            <a:schemeClr val="accent1"/>
+          </a:lnRef>
+          <a:fillRef idx="0">
+            <a:schemeClr val="accent1"/>
+          </a:fillRef>
+          <a:effectRef idx="0">
+            <a:schemeClr val="accent1"/>
+          </a:effectRef>
+          <a:fontRef idx="minor">
+            <a:schemeClr val="tx1"/>
+          </a:fontRef>
+        </p:style>
+      </p:cxnSp>
+      <p:cxnSp>
+        <p:nvCxnSpPr>
+          <p:cNvPr id="155" name="肘形连接符 154"/>
+          <p:cNvCxnSpPr>
+            <a:endCxn id="149" idx="3"/>
+          </p:cNvCxnSpPr>
+          <p:nvPr/>
+        </p:nvCxnSpPr>
+        <p:spPr>
+          <a:xfrm rot="10800000" flipV="1">
+            <a:off x="8184907" y="2732674"/>
+            <a:ext cx="1980769" cy="1453287"/>
+          </a:xfrm>
+          <a:prstGeom prst="bentConnector3">
+            <a:avLst>
+              <a:gd name="adj1" fmla="val 572"/>
+            </a:avLst>
+          </a:prstGeom>
+          <a:ln>
+            <a:tailEnd type="triangle"/>
+          </a:ln>
+        </p:spPr>
+        <p:style>
+          <a:lnRef idx="1">
+            <a:schemeClr val="accent1"/>
+          </a:lnRef>
+          <a:fillRef idx="0">
+            <a:schemeClr val="accent1"/>
+          </a:fillRef>
+          <a:effectRef idx="0">
+            <a:schemeClr val="accent1"/>
+          </a:effectRef>
+          <a:fontRef idx="minor">
+            <a:schemeClr val="tx1"/>
+          </a:fontRef>
+        </p:style>
+      </p:cxnSp>
+      <p:cxnSp>
+        <p:nvCxnSpPr>
+          <p:cNvPr id="31" name="直接箭头连接符 30"/>
+          <p:cNvCxnSpPr>
+            <a:stCxn id="134" idx="3"/>
+            <a:endCxn id="139" idx="2"/>
+          </p:cNvCxnSpPr>
+          <p:nvPr/>
+        </p:nvCxnSpPr>
+        <p:spPr>
+          <a:xfrm>
+            <a:off x="7353516" y="2625991"/>
+            <a:ext cx="428059" cy="2796"/>
+          </a:xfrm>
+          <a:prstGeom prst="straightConnector1">
+            <a:avLst/>
+          </a:prstGeom>
+          <a:ln>
+            <a:tailEnd type="triangle"/>
+          </a:ln>
+        </p:spPr>
+        <p:style>
+          <a:lnRef idx="1">
+            <a:schemeClr val="accent1"/>
+          </a:lnRef>
+          <a:fillRef idx="0">
+            <a:schemeClr val="accent1"/>
+          </a:fillRef>
+          <a:effectRef idx="0">
+            <a:schemeClr val="accent1"/>
+          </a:effectRef>
+          <a:fontRef idx="minor">
+            <a:schemeClr val="tx1"/>
+          </a:fontRef>
+        </p:style>
+      </p:cxnSp>
+      <p:cxnSp>
+        <p:nvCxnSpPr>
+          <p:cNvPr id="56" name="直接箭头连接符 55"/>
+          <p:cNvCxnSpPr>
+            <a:stCxn id="115" idx="6"/>
+          </p:cNvCxnSpPr>
+          <p:nvPr/>
+        </p:nvCxnSpPr>
+        <p:spPr>
+          <a:xfrm>
+            <a:off x="6209530" y="2346184"/>
+            <a:ext cx="588274" cy="506"/>
+          </a:xfrm>
+          <a:prstGeom prst="straightConnector1">
+            <a:avLst/>
+          </a:prstGeom>
+          <a:ln>
+            <a:tailEnd type="triangle"/>
+          </a:ln>
+        </p:spPr>
+        <p:style>
+          <a:lnRef idx="1">
+            <a:schemeClr val="accent1"/>
+          </a:lnRef>
+          <a:fillRef idx="0">
+            <a:schemeClr val="accent1"/>
+          </a:fillRef>
+          <a:effectRef idx="0">
+            <a:schemeClr val="accent1"/>
+          </a:effectRef>
+          <a:fontRef idx="minor">
+            <a:schemeClr val="tx1"/>
+          </a:fontRef>
+        </p:style>
+      </p:cxnSp>
+      <p:cxnSp>
+        <p:nvCxnSpPr>
+          <p:cNvPr id="180" name="直接箭头连接符 179"/>
+          <p:cNvCxnSpPr>
+            <a:stCxn id="118" idx="6"/>
+          </p:cNvCxnSpPr>
+          <p:nvPr/>
+        </p:nvCxnSpPr>
+        <p:spPr>
+          <a:xfrm flipV="1">
+            <a:off x="5945317" y="2951843"/>
+            <a:ext cx="852029" cy="507"/>
+          </a:xfrm>
+          <a:prstGeom prst="straightConnector1">
+            <a:avLst/>
+          </a:prstGeom>
+          <a:ln>
+            <a:tailEnd type="triangle"/>
+          </a:ln>
+        </p:spPr>
+        <p:style>
+          <a:lnRef idx="1">
+            <a:schemeClr val="accent1"/>
+          </a:lnRef>
+          <a:fillRef idx="0">
+            <a:schemeClr val="accent1"/>
+          </a:fillRef>
+          <a:effectRef idx="0">
+            <a:schemeClr val="accent1"/>
+          </a:effectRef>
+          <a:fontRef idx="minor">
+            <a:schemeClr val="tx1"/>
+          </a:fontRef>
+        </p:style>
+      </p:cxnSp>
+      <p:cxnSp>
+        <p:nvCxnSpPr>
+          <p:cNvPr id="158" name="肘形连接符 157"/>
+          <p:cNvCxnSpPr>
+            <a:stCxn id="149" idx="1"/>
+            <a:endCxn id="115" idx="4"/>
+          </p:cNvCxnSpPr>
+          <p:nvPr/>
+        </p:nvCxnSpPr>
+        <p:spPr>
+          <a:xfrm rot="10800000">
+            <a:off x="6111877" y="2443838"/>
+            <a:ext cx="1476079" cy="1742124"/>
+          </a:xfrm>
+          <a:prstGeom prst="bentConnector2">
+            <a:avLst/>
+          </a:prstGeom>
+          <a:ln>
+            <a:tailEnd type="triangle"/>
+          </a:ln>
+        </p:spPr>
+        <p:style>
+          <a:lnRef idx="1">
+            <a:schemeClr val="accent1"/>
+          </a:lnRef>
+          <a:fillRef idx="0">
+            <a:schemeClr val="accent1"/>
+          </a:fillRef>
+          <a:effectRef idx="0">
+            <a:schemeClr val="accent1"/>
+          </a:effectRef>
+          <a:fontRef idx="minor">
+            <a:schemeClr val="tx1"/>
+          </a:fontRef>
+        </p:style>
+      </p:cxnSp>
+      <p:sp>
+        <p:nvSpPr>
+          <p:cNvPr id="194" name="圆角矩形 193"/>
+          <p:cNvSpPr/>
+          <p:nvPr/>
+        </p:nvSpPr>
+        <p:spPr>
+          <a:xfrm>
+            <a:off x="7641191" y="3149456"/>
+            <a:ext cx="486233" cy="336628"/>
+          </a:xfrm>
+          <a:prstGeom prst="roundRect">
+            <a:avLst/>
+          </a:prstGeom>
+          <a:noFill/>
+        </p:spPr>
+        <p:style>
+          <a:lnRef idx="2">
+            <a:schemeClr val="accent1">
+              <a:shade val="50000"/>
+            </a:schemeClr>
+          </a:lnRef>
+          <a:fillRef idx="1">
+            <a:schemeClr val="accent1"/>
+          </a:fillRef>
+          <a:effectRef idx="0">
+            <a:schemeClr val="accent1"/>
+          </a:effectRef>
+          <a:fontRef idx="minor">
+            <a:schemeClr val="lt1"/>
+          </a:fontRef>
+        </p:style>
+        <p:txBody>
+          <a:bodyPr rtlCol="0" anchor="ctr"/>
+          <a:lstStyle/>
+          <a:p>
+            <a:pPr algn="ctr"/>
+            <a:r>
+              <a:rPr lang="en-US" altLang="zh-CN" sz="1200" dirty="0" smtClean="0">
+                <a:solidFill>
+                  <a:schemeClr val="tx1"/>
+                </a:solidFill>
+              </a:rPr>
+              <a:t>b0</a:t>
+            </a:r>
+            <a:endParaRPr lang="zh-CN" altLang="en-US" sz="1200" dirty="0">
+              <a:solidFill>
+                <a:schemeClr val="tx1"/>
+              </a:solidFill>
+            </a:endParaRPr>
+          </a:p>
+        </p:txBody>
+      </p:sp>
+      <p:cxnSp>
+        <p:nvCxnSpPr>
+          <p:cNvPr id="198" name="直接箭头连接符 197"/>
+          <p:cNvCxnSpPr>
+            <a:stCxn id="149" idx="0"/>
+            <a:endCxn id="194" idx="2"/>
+          </p:cNvCxnSpPr>
+          <p:nvPr/>
+        </p:nvCxnSpPr>
+        <p:spPr>
+          <a:xfrm flipH="1" flipV="1">
+            <a:off x="7884308" y="3486084"/>
+            <a:ext cx="2123" cy="316290"/>
+          </a:xfrm>
+          <a:prstGeom prst="straightConnector1">
+            <a:avLst/>
+          </a:prstGeom>
+          <a:ln>
+            <a:tailEnd type="triangle"/>
+          </a:ln>
+        </p:spPr>
+        <p:style>
+          <a:lnRef idx="1">
+            <a:schemeClr val="accent1"/>
+          </a:lnRef>
+          <a:fillRef idx="0">
+            <a:schemeClr val="accent1"/>
+          </a:fillRef>
+          <a:effectRef idx="0">
+            <a:schemeClr val="accent1"/>
+          </a:effectRef>
+          <a:fontRef idx="minor">
+            <a:schemeClr val="tx1"/>
+          </a:fontRef>
+        </p:style>
+      </p:cxnSp>
+      <p:cxnSp>
+        <p:nvCxnSpPr>
+          <p:cNvPr id="214" name="直接箭头连接符 213"/>
+          <p:cNvCxnSpPr>
+            <a:stCxn id="194" idx="0"/>
+            <a:endCxn id="139" idx="4"/>
+          </p:cNvCxnSpPr>
+          <p:nvPr/>
+        </p:nvCxnSpPr>
+        <p:spPr>
+          <a:xfrm flipH="1" flipV="1">
+            <a:off x="7879229" y="2726441"/>
+            <a:ext cx="5079" cy="423015"/>
+          </a:xfrm>
+          <a:prstGeom prst="straightConnector1">
+            <a:avLst/>
+          </a:prstGeom>
+          <a:ln>
+            <a:tailEnd type="triangle"/>
+          </a:ln>
+        </p:spPr>
+        <p:style>
+          <a:lnRef idx="1">
+            <a:schemeClr val="accent1"/>
+          </a:lnRef>
+          <a:fillRef idx="0">
+            <a:schemeClr val="accent1"/>
+          </a:fillRef>
+          <a:effectRef idx="0">
+            <a:schemeClr val="accent1"/>
+          </a:effectRef>
+          <a:fontRef idx="minor">
+            <a:schemeClr val="tx1"/>
+          </a:fontRef>
+        </p:style>
+      </p:cxnSp>
+      <p:cxnSp>
+        <p:nvCxnSpPr>
+          <p:cNvPr id="209" name="直接箭头连接符 208"/>
+          <p:cNvCxnSpPr>
+            <a:stCxn id="101" idx="3"/>
+            <a:endCxn id="109" idx="1"/>
+          </p:cNvCxnSpPr>
+          <p:nvPr/>
+        </p:nvCxnSpPr>
+        <p:spPr>
+          <a:xfrm flipV="1">
+            <a:off x="4220085" y="2636753"/>
+            <a:ext cx="603388" cy="970"/>
+          </a:xfrm>
+          <a:prstGeom prst="straightConnector1">
+            <a:avLst/>
+          </a:prstGeom>
+          <a:ln>
+            <a:tailEnd type="triangle"/>
+          </a:ln>
+        </p:spPr>
+        <p:style>
+          <a:lnRef idx="1">
+            <a:schemeClr val="accent1"/>
+          </a:lnRef>
+          <a:fillRef idx="0">
+            <a:schemeClr val="accent1"/>
+          </a:fillRef>
+          <a:effectRef idx="0">
+            <a:schemeClr val="accent1"/>
+          </a:effectRef>
+          <a:fontRef idx="minor">
+            <a:schemeClr val="tx1"/>
+          </a:fontRef>
+        </p:style>
+      </p:cxnSp>
+      <p:cxnSp>
+        <p:nvCxnSpPr>
+          <p:cNvPr id="220" name="肘形连接符 219"/>
+          <p:cNvCxnSpPr/>
+          <p:nvPr/>
+        </p:nvCxnSpPr>
+        <p:spPr>
+          <a:xfrm flipV="1">
+            <a:off x="4992843" y="3096190"/>
+            <a:ext cx="854830" cy="760772"/>
+          </a:xfrm>
+          <a:prstGeom prst="bentConnector2">
+            <a:avLst/>
+          </a:prstGeom>
+          <a:ln>
+            <a:tailEnd type="triangle"/>
+          </a:ln>
+        </p:spPr>
+        <p:style>
+          <a:lnRef idx="1">
+            <a:schemeClr val="accent1"/>
+          </a:lnRef>
+          <a:fillRef idx="0">
+            <a:schemeClr val="accent1"/>
+          </a:fillRef>
+          <a:effectRef idx="0">
+            <a:schemeClr val="accent1"/>
+          </a:effectRef>
+          <a:fontRef idx="minor">
+            <a:schemeClr val="tx1"/>
+          </a:fontRef>
+        </p:style>
+      </p:cxnSp>
+      <p:sp>
+        <p:nvSpPr>
+          <p:cNvPr id="232" name="文本框 231"/>
+          <p:cNvSpPr txBox="1"/>
+          <p:nvPr/>
+        </p:nvSpPr>
+        <p:spPr>
+          <a:xfrm>
+            <a:off x="5041884" y="3576131"/>
+            <a:ext cx="792214" cy="276999"/>
+          </a:xfrm>
+          <a:prstGeom prst="rect">
+            <a:avLst/>
+          </a:prstGeom>
+          <a:noFill/>
+        </p:spPr>
+        <p:txBody>
+          <a:bodyPr wrap="square" rtlCol="0">
+            <a:spAutoFit/>
+          </a:bodyPr>
+          <a:lstStyle/>
+          <a:p>
+            <a:r>
+              <a:rPr lang="en-US" altLang="zh-CN" sz="1200" dirty="0" smtClean="0">
+                <a:latin typeface="Calibri" panose="020F0502020204030204" pitchFamily="34" charset="0"/>
+                <a:cs typeface="Calibri" panose="020F0502020204030204" pitchFamily="34" charset="0"/>
+              </a:rPr>
+              <a:t>State.acc</a:t>
+            </a:r>
+            <a:endParaRPr lang="zh-CN" altLang="en-US" sz="1200" dirty="0">
+              <a:latin typeface="Calibri" panose="020F0502020204030204" pitchFamily="34" charset="0"/>
+              <a:cs typeface="Calibri" panose="020F0502020204030204" pitchFamily="34" charset="0"/>
+            </a:endParaRPr>
+          </a:p>
+        </p:txBody>
+      </p:sp>
+      <p:sp>
+        <p:nvSpPr>
+          <p:cNvPr id="234" name="文本框 233"/>
+          <p:cNvSpPr txBox="1"/>
+          <p:nvPr/>
+        </p:nvSpPr>
+        <p:spPr>
+          <a:xfrm>
+            <a:off x="4254011" y="2395798"/>
+            <a:ext cx="577098" cy="276999"/>
+          </a:xfrm>
+          <a:prstGeom prst="rect">
+            <a:avLst/>
+          </a:prstGeom>
+          <a:noFill/>
+        </p:spPr>
+        <p:txBody>
+          <a:bodyPr wrap="square" rtlCol="0">
+            <a:spAutoFit/>
+          </a:bodyPr>
+          <a:lstStyle/>
+          <a:p>
+            <a:r>
+              <a:rPr lang="en-US" altLang="zh-CN" sz="1200" dirty="0" smtClean="0">
+                <a:latin typeface="Calibri" panose="020F0502020204030204" pitchFamily="34" charset="0"/>
+                <a:cs typeface="Calibri" panose="020F0502020204030204" pitchFamily="34" charset="0"/>
+              </a:rPr>
+              <a:t>VZ_d</a:t>
+            </a:r>
+            <a:endParaRPr lang="zh-CN" altLang="en-US" sz="1200" dirty="0">
+              <a:latin typeface="Calibri" panose="020F0502020204030204" pitchFamily="34" charset="0"/>
+              <a:cs typeface="Calibri" panose="020F0502020204030204" pitchFamily="34" charset="0"/>
+            </a:endParaRPr>
+          </a:p>
+        </p:txBody>
+      </p:sp>
+      <p:cxnSp>
+        <p:nvCxnSpPr>
+          <p:cNvPr id="223" name="直接箭头连接符 222"/>
+          <p:cNvCxnSpPr>
+            <a:stCxn id="103" idx="6"/>
+          </p:cNvCxnSpPr>
+          <p:nvPr/>
+        </p:nvCxnSpPr>
+        <p:spPr>
+          <a:xfrm>
+            <a:off x="3410260" y="2339041"/>
+            <a:ext cx="254113" cy="0"/>
+          </a:xfrm>
+          <a:prstGeom prst="straightConnector1">
+            <a:avLst/>
+          </a:prstGeom>
+          <a:ln>
+            <a:tailEnd type="triangle"/>
+          </a:ln>
+        </p:spPr>
+        <p:style>
+          <a:lnRef idx="1">
+            <a:schemeClr val="accent1"/>
+          </a:lnRef>
+          <a:fillRef idx="0">
+            <a:schemeClr val="accent1"/>
+          </a:fillRef>
+          <a:effectRef idx="0">
+            <a:schemeClr val="accent1"/>
+          </a:effectRef>
+          <a:fontRef idx="minor">
+            <a:schemeClr val="tx1"/>
+          </a:fontRef>
+        </p:style>
+      </p:cxnSp>
+      <p:cxnSp>
+        <p:nvCxnSpPr>
+          <p:cNvPr id="237" name="直接箭头连接符 236"/>
+          <p:cNvCxnSpPr>
+            <a:stCxn id="106" idx="6"/>
+          </p:cNvCxnSpPr>
+          <p:nvPr/>
+        </p:nvCxnSpPr>
+        <p:spPr>
+          <a:xfrm flipV="1">
+            <a:off x="3146047" y="2951843"/>
+            <a:ext cx="518326" cy="507"/>
+          </a:xfrm>
+          <a:prstGeom prst="straightConnector1">
+            <a:avLst/>
+          </a:prstGeom>
+          <a:ln>
+            <a:tailEnd type="triangle"/>
+          </a:ln>
+        </p:spPr>
+        <p:style>
+          <a:lnRef idx="1">
+            <a:schemeClr val="accent1"/>
+          </a:lnRef>
+          <a:fillRef idx="0">
+            <a:schemeClr val="accent1"/>
+          </a:fillRef>
+          <a:effectRef idx="0">
+            <a:schemeClr val="accent1"/>
+          </a:effectRef>
+          <a:fontRef idx="minor">
+            <a:schemeClr val="tx1"/>
+          </a:fontRef>
+        </p:style>
+      </p:cxnSp>
+      <p:cxnSp>
+        <p:nvCxnSpPr>
+          <p:cNvPr id="239" name="肘形连接符 238"/>
+          <p:cNvCxnSpPr>
+            <a:endCxn id="103" idx="4"/>
+          </p:cNvCxnSpPr>
+          <p:nvPr/>
+        </p:nvCxnSpPr>
+        <p:spPr>
+          <a:xfrm rot="16200000" flipV="1">
+            <a:off x="3156974" y="2592327"/>
+            <a:ext cx="1139436" cy="828172"/>
+          </a:xfrm>
+          <a:prstGeom prst="bentConnector3">
+            <a:avLst>
+              <a:gd name="adj1" fmla="val 680"/>
+            </a:avLst>
+          </a:prstGeom>
+          <a:ln>
+            <a:tailEnd type="triangle"/>
+          </a:ln>
+        </p:spPr>
+        <p:style>
+          <a:lnRef idx="1">
+            <a:schemeClr val="accent1"/>
+          </a:lnRef>
+          <a:fillRef idx="0">
+            <a:schemeClr val="accent1"/>
+          </a:fillRef>
+          <a:effectRef idx="0">
+            <a:schemeClr val="accent1"/>
+          </a:effectRef>
+          <a:fontRef idx="minor">
+            <a:schemeClr val="tx1"/>
+          </a:fontRef>
+        </p:style>
+      </p:cxnSp>
+      <p:sp>
+        <p:nvSpPr>
+          <p:cNvPr id="240" name="文本框 239"/>
+          <p:cNvSpPr txBox="1"/>
+          <p:nvPr/>
+        </p:nvSpPr>
+        <p:spPr>
+          <a:xfrm>
+            <a:off x="3291510" y="3315022"/>
+            <a:ext cx="1244202" cy="276999"/>
+          </a:xfrm>
+          <a:prstGeom prst="rect">
+            <a:avLst/>
+          </a:prstGeom>
+          <a:noFill/>
+        </p:spPr>
+        <p:txBody>
+          <a:bodyPr wrap="square" rtlCol="0">
+            <a:spAutoFit/>
+          </a:bodyPr>
+          <a:lstStyle/>
+          <a:p>
+            <a:r>
+              <a:rPr lang="en-US" altLang="zh-CN" sz="1200" dirty="0" smtClean="0">
+                <a:latin typeface="Calibri" panose="020F0502020204030204" pitchFamily="34" charset="0"/>
+                <a:cs typeface="Calibri" panose="020F0502020204030204" pitchFamily="34" charset="0"/>
+              </a:rPr>
+              <a:t>State.position.z</a:t>
+            </a:r>
+            <a:endParaRPr lang="zh-CN" altLang="en-US" sz="1200" dirty="0">
+              <a:latin typeface="Calibri" panose="020F0502020204030204" pitchFamily="34" charset="0"/>
+              <a:cs typeface="Calibri" panose="020F0502020204030204" pitchFamily="34" charset="0"/>
+            </a:endParaRPr>
+          </a:p>
+        </p:txBody>
+      </p:sp>
+      <p:cxnSp>
+        <p:nvCxnSpPr>
+          <p:cNvPr id="244" name="肘形连接符 243"/>
+          <p:cNvCxnSpPr>
+            <a:endCxn id="106" idx="4"/>
+          </p:cNvCxnSpPr>
+          <p:nvPr/>
+        </p:nvCxnSpPr>
+        <p:spPr>
+          <a:xfrm rot="10800000">
+            <a:off x="3048394" y="3050004"/>
+            <a:ext cx="1138779" cy="803126"/>
+          </a:xfrm>
+          <a:prstGeom prst="bentConnector2">
+            <a:avLst/>
+          </a:prstGeom>
+          <a:ln>
+            <a:tailEnd type="triangle"/>
+          </a:ln>
+        </p:spPr>
+        <p:style>
+          <a:lnRef idx="1">
+            <a:schemeClr val="accent1"/>
+          </a:lnRef>
+          <a:fillRef idx="0">
+            <a:schemeClr val="accent1"/>
+          </a:fillRef>
+          <a:effectRef idx="0">
+            <a:schemeClr val="accent1"/>
+          </a:effectRef>
+          <a:fontRef idx="minor">
+            <a:schemeClr val="tx1"/>
+          </a:fontRef>
+        </p:style>
+      </p:cxnSp>
+      <p:sp>
+        <p:nvSpPr>
+          <p:cNvPr id="245" name="文本框 244"/>
+          <p:cNvSpPr txBox="1"/>
+          <p:nvPr/>
+        </p:nvSpPr>
+        <p:spPr>
+          <a:xfrm>
+            <a:off x="3291510" y="3608316"/>
+            <a:ext cx="1213830" cy="276999"/>
+          </a:xfrm>
+          <a:prstGeom prst="rect">
+            <a:avLst/>
+          </a:prstGeom>
+          <a:noFill/>
+        </p:spPr>
+        <p:txBody>
+          <a:bodyPr wrap="square" rtlCol="0">
+            <a:spAutoFit/>
+          </a:bodyPr>
+          <a:lstStyle/>
+          <a:p>
+            <a:r>
+              <a:rPr lang="en-US" altLang="zh-CN" sz="1200" dirty="0" smtClean="0">
+                <a:latin typeface="Calibri" panose="020F0502020204030204" pitchFamily="34" charset="0"/>
+                <a:cs typeface="Calibri" panose="020F0502020204030204" pitchFamily="34" charset="0"/>
+              </a:rPr>
+              <a:t>State.velocity.z</a:t>
+            </a:r>
+            <a:endParaRPr lang="zh-CN" altLang="en-US" sz="1200" dirty="0">
+              <a:latin typeface="Calibri" panose="020F0502020204030204" pitchFamily="34" charset="0"/>
+              <a:cs typeface="Calibri" panose="020F0502020204030204" pitchFamily="34" charset="0"/>
+            </a:endParaRPr>
+          </a:p>
+        </p:txBody>
+      </p:sp>
+      <p:sp>
+        <p:nvSpPr>
+          <p:cNvPr id="261" name="圆角矩形 260"/>
+          <p:cNvSpPr/>
+          <p:nvPr/>
+        </p:nvSpPr>
+        <p:spPr>
+          <a:xfrm>
+            <a:off x="6797346" y="4859475"/>
+            <a:ext cx="807868" cy="452761"/>
+          </a:xfrm>
+          <a:prstGeom prst="roundRect">
+            <a:avLst/>
+          </a:prstGeom>
+        </p:spPr>
+        <p:style>
+          <a:lnRef idx="2">
+            <a:schemeClr val="accent1">
+              <a:shade val="50000"/>
+            </a:schemeClr>
+          </a:lnRef>
+          <a:fillRef idx="1">
+            <a:schemeClr val="accent1"/>
+          </a:fillRef>
+          <a:effectRef idx="0">
+            <a:schemeClr val="accent1"/>
+          </a:effectRef>
+          <a:fontRef idx="minor">
+            <a:schemeClr val="lt1"/>
+          </a:fontRef>
+        </p:style>
+        <p:txBody>
+          <a:bodyPr rtlCol="0" anchor="ctr"/>
+          <a:lstStyle/>
+          <a:p>
+            <a:pPr algn="ctr"/>
+            <a:r>
+              <a:rPr lang="en-US" altLang="zh-CN" sz="1200" dirty="0" smtClean="0"/>
+              <a:t>MBD</a:t>
+            </a:r>
+          </a:p>
+        </p:txBody>
+      </p:sp>
+      <p:sp>
+        <p:nvSpPr>
+          <p:cNvPr id="323" name="流程图: 接点 322"/>
+          <p:cNvSpPr/>
+          <p:nvPr/>
+        </p:nvSpPr>
+        <p:spPr>
+          <a:xfrm>
+            <a:off x="8717862" y="2525784"/>
+            <a:ext cx="195308" cy="195308"/>
+          </a:xfrm>
+          <a:prstGeom prst="flowChartConnector">
+            <a:avLst/>
+          </a:prstGeom>
+          <a:noFill/>
+          <a:ln>
+            <a:solidFill>
+              <a:schemeClr val="accent1"/>
+            </a:solidFill>
+          </a:ln>
+        </p:spPr>
+        <p:style>
+          <a:lnRef idx="2">
+            <a:schemeClr val="accent1">
+              <a:shade val="50000"/>
+            </a:schemeClr>
+          </a:lnRef>
+          <a:fillRef idx="1">
+            <a:schemeClr val="accent1"/>
+          </a:fillRef>
+          <a:effectRef idx="0">
+            <a:schemeClr val="accent1"/>
+          </a:effectRef>
+          <a:fontRef idx="minor">
+            <a:schemeClr val="lt1"/>
+          </a:fontRef>
+        </p:style>
+        <p:txBody>
+          <a:bodyPr rtlCol="0" anchor="ctr"/>
+          <a:lstStyle/>
+          <a:p>
+            <a:pPr algn="ctr"/>
+            <a:endParaRPr lang="zh-CN" altLang="en-US"/>
+          </a:p>
+        </p:txBody>
+      </p:sp>
+      <p:sp>
+        <p:nvSpPr>
+          <p:cNvPr id="324" name="加号 323"/>
+          <p:cNvSpPr/>
+          <p:nvPr/>
+        </p:nvSpPr>
+        <p:spPr>
+          <a:xfrm>
+            <a:off x="8651771" y="2481696"/>
+            <a:ext cx="90000" cy="88174"/>
+          </a:xfrm>
+          <a:prstGeom prst="mathPlus">
+            <a:avLst/>
+          </a:prstGeom>
+          <a:ln w="0">
+            <a:noFill/>
+          </a:ln>
+        </p:spPr>
+        <p:style>
+          <a:lnRef idx="2">
+            <a:schemeClr val="accent1">
+              <a:shade val="50000"/>
+            </a:schemeClr>
+          </a:lnRef>
+          <a:fillRef idx="1">
+            <a:schemeClr val="accent1"/>
+          </a:fillRef>
+          <a:effectRef idx="0">
+            <a:schemeClr val="accent1"/>
+          </a:effectRef>
+          <a:fontRef idx="minor">
+            <a:schemeClr val="lt1"/>
+          </a:fontRef>
+        </p:style>
+        <p:txBody>
+          <a:bodyPr rtlCol="0" anchor="ctr"/>
+          <a:lstStyle/>
+          <a:p>
+            <a:pPr algn="ctr"/>
+            <a:endParaRPr lang="zh-CN" altLang="en-US"/>
+          </a:p>
+        </p:txBody>
+      </p:sp>
+      <p:sp>
+        <p:nvSpPr>
+          <p:cNvPr id="328" name="加号 327"/>
+          <p:cNvSpPr/>
+          <p:nvPr/>
+        </p:nvSpPr>
+        <p:spPr>
+          <a:xfrm>
+            <a:off x="8859180" y="2708129"/>
+            <a:ext cx="90000" cy="88174"/>
+          </a:xfrm>
+          <a:prstGeom prst="mathPlus">
+            <a:avLst/>
+          </a:prstGeom>
+          <a:ln w="0">
+            <a:noFill/>
+          </a:ln>
+        </p:spPr>
+        <p:style>
+          <a:lnRef idx="2">
+            <a:schemeClr val="accent1">
+              <a:shade val="50000"/>
+            </a:schemeClr>
+          </a:lnRef>
+          <a:fillRef idx="1">
+            <a:schemeClr val="accent1"/>
+          </a:fillRef>
+          <a:effectRef idx="0">
+            <a:schemeClr val="accent1"/>
+          </a:effectRef>
+          <a:fontRef idx="minor">
+            <a:schemeClr val="lt1"/>
+          </a:fontRef>
+        </p:style>
+        <p:txBody>
+          <a:bodyPr rtlCol="0" anchor="ctr"/>
+          <a:lstStyle/>
+          <a:p>
+            <a:pPr algn="ctr"/>
+            <a:endParaRPr lang="zh-CN" altLang="en-US"/>
+          </a:p>
+        </p:txBody>
+      </p:sp>
+      <p:cxnSp>
+        <p:nvCxnSpPr>
+          <p:cNvPr id="330" name="肘形连接符 329"/>
+          <p:cNvCxnSpPr>
+            <a:stCxn id="261" idx="3"/>
+            <a:endCxn id="323" idx="4"/>
+          </p:cNvCxnSpPr>
+          <p:nvPr/>
+        </p:nvCxnSpPr>
+        <p:spPr>
+          <a:xfrm flipV="1">
+            <a:off x="7605214" y="2721092"/>
+            <a:ext cx="1210302" cy="2364764"/>
+          </a:xfrm>
+          <a:prstGeom prst="bentConnector2">
+            <a:avLst/>
+          </a:prstGeom>
+          <a:ln>
+            <a:tailEnd type="triangle"/>
+          </a:ln>
+        </p:spPr>
+        <p:style>
+          <a:lnRef idx="1">
+            <a:schemeClr val="accent1"/>
+          </a:lnRef>
+          <a:fillRef idx="0">
+            <a:schemeClr val="accent1"/>
+          </a:fillRef>
+          <a:effectRef idx="0">
+            <a:schemeClr val="accent1"/>
+          </a:effectRef>
+          <a:fontRef idx="minor">
+            <a:schemeClr val="tx1"/>
+          </a:fontRef>
+        </p:style>
+      </p:cxnSp>
+      <p:cxnSp>
+        <p:nvCxnSpPr>
+          <p:cNvPr id="332" name="直接箭头连接符 331"/>
+          <p:cNvCxnSpPr>
+            <a:stCxn id="323" idx="6"/>
+            <a:endCxn id="150" idx="1"/>
+          </p:cNvCxnSpPr>
+          <p:nvPr/>
+        </p:nvCxnSpPr>
+        <p:spPr>
+          <a:xfrm>
+            <a:off x="8913170" y="2623438"/>
+            <a:ext cx="278751" cy="2553"/>
+          </a:xfrm>
+          <a:prstGeom prst="straightConnector1">
+            <a:avLst/>
+          </a:prstGeom>
+          <a:ln>
+            <a:tailEnd type="triangle"/>
+          </a:ln>
+        </p:spPr>
+        <p:style>
+          <a:lnRef idx="1">
+            <a:schemeClr val="accent1"/>
+          </a:lnRef>
+          <a:fillRef idx="0">
+            <a:schemeClr val="accent1"/>
+          </a:fillRef>
+          <a:effectRef idx="0">
+            <a:schemeClr val="accent1"/>
+          </a:effectRef>
+          <a:fontRef idx="minor">
+            <a:schemeClr val="tx1"/>
+          </a:fontRef>
+        </p:style>
+      </p:cxnSp>
+      <p:cxnSp>
+        <p:nvCxnSpPr>
+          <p:cNvPr id="5" name="肘形连接符 4"/>
+          <p:cNvCxnSpPr>
+            <a:stCxn id="113" idx="2"/>
+            <a:endCxn id="261" idx="1"/>
+          </p:cNvCxnSpPr>
+          <p:nvPr/>
+        </p:nvCxnSpPr>
+        <p:spPr>
+          <a:xfrm rot="16200000" flipH="1">
+            <a:off x="5135499" y="3424009"/>
+            <a:ext cx="2124684" cy="1199010"/>
+          </a:xfrm>
+          <a:prstGeom prst="bentConnector2">
+            <a:avLst/>
+          </a:prstGeom>
+          <a:ln>
+            <a:tailEnd type="triangle"/>
+          </a:ln>
+        </p:spPr>
+        <p:style>
+          <a:lnRef idx="1">
+            <a:schemeClr val="accent1"/>
+          </a:lnRef>
+          <a:fillRef idx="0">
+            <a:schemeClr val="accent1"/>
+          </a:fillRef>
+          <a:effectRef idx="0">
+            <a:schemeClr val="accent1"/>
+          </a:effectRef>
+          <a:fontRef idx="minor">
+            <a:schemeClr val="tx1"/>
+          </a:fontRef>
+        </p:style>
+      </p:cxnSp>
+    </p:spTree>
+    <p:extLst>
+      <p:ext uri="{BB962C8B-B14F-4D97-AF65-F5344CB8AC3E}">
+        <p14:creationId xmlns:p14="http://schemas.microsoft.com/office/powerpoint/2010/main" val="3376092932"/>
+      </p:ext>
+    </p:extLst>
+  </p:cSld>
+  <p:clrMapOvr>
+    <a:masterClrMapping/>
+  </p:clrMapOvr>
+</p:sld>
+</file>
+
+<file path=ppt/slides/slide4.xml><?xml version="1.0" encoding="utf-8"?>
+<p:sld xmlns:a="http://schemas.openxmlformats.org/drawingml/2006/main" xmlns:r="http://schemas.openxmlformats.org/officeDocument/2006/relationships" xmlns:p="http://schemas.openxmlformats.org/presentationml/2006/main">
+  <p:cSld>
+    <p:spTree>
+      <p:nvGrpSpPr>
+        <p:cNvPr id="1" name=""/>
+        <p:cNvGrpSpPr/>
+        <p:nvPr/>
+      </p:nvGrpSpPr>
+      <p:grpSpPr>
+        <a:xfrm>
+          <a:off x="0" y="0"/>
+          <a:ext cx="0" cy="0"/>
+          <a:chOff x="0" y="0"/>
+          <a:chExt cx="0" cy="0"/>
+        </a:xfrm>
+      </p:grpSpPr>
+      <p:sp>
+        <p:nvSpPr>
+          <p:cNvPr id="228" name="圆角矩形 227"/>
+          <p:cNvSpPr/>
+          <p:nvPr/>
+        </p:nvSpPr>
+        <p:spPr>
+          <a:xfrm>
+            <a:off x="360218" y="304800"/>
+            <a:ext cx="3210016" cy="905163"/>
+          </a:xfrm>
+          <a:prstGeom prst="roundRect">
+            <a:avLst/>
+          </a:prstGeom>
+          <a:solidFill>
+            <a:srgbClr val="FF0000"/>
+          </a:solidFill>
+        </p:spPr>
+        <p:style>
+          <a:lnRef idx="2">
+            <a:schemeClr val="accent1">
+              <a:shade val="50000"/>
+            </a:schemeClr>
+          </a:lnRef>
+          <a:fillRef idx="1">
+            <a:schemeClr val="accent1"/>
+          </a:fillRef>
+          <a:effectRef idx="0">
+            <a:schemeClr val="accent1"/>
+          </a:effectRef>
+          <a:fontRef idx="minor">
+            <a:schemeClr val="lt1"/>
+          </a:fontRef>
+        </p:style>
+        <p:txBody>
+          <a:bodyPr rtlCol="0" anchor="ctr"/>
+          <a:lstStyle/>
+          <a:p>
+            <a:pPr algn="ctr"/>
+            <a:r>
+              <a:rPr lang="en-US" altLang="zh-CN" dirty="0" smtClean="0"/>
+              <a:t>The control block diagram</a:t>
+            </a:r>
+          </a:p>
+          <a:p>
+            <a:pPr algn="ctr"/>
+            <a:r>
+              <a:rPr lang="en-US" altLang="zh-CN" dirty="0" smtClean="0"/>
+              <a:t> in this program</a:t>
+            </a:r>
+            <a:endParaRPr lang="zh-CN" altLang="en-US" dirty="0"/>
+          </a:p>
+        </p:txBody>
+      </p:sp>
+    </p:spTree>
+    <p:extLst>
+      <p:ext uri="{BB962C8B-B14F-4D97-AF65-F5344CB8AC3E}">
+        <p14:creationId xmlns:p14="http://schemas.microsoft.com/office/powerpoint/2010/main" val="4006818919"/>
       </p:ext>
     </p:extLst>
   </p:cSld>

</xml_diff>